<commit_message>
modify nurie & LaTeX file
</commit_message>
<xml_diff>
--- a/presen/presen.pptx
+++ b/presen/presen.pptx
@@ -7,16 +7,26 @@
     <p:sldMasterId id="2147483683" r:id="rId3"/>
   </p:sldMasterIdLst>
   <p:notesMasterIdLst>
-    <p:notesMasterId r:id="rId11"/>
+    <p:notesMasterId r:id="rId21"/>
   </p:notesMasterIdLst>
   <p:sldIdLst>
     <p:sldId id="257" r:id="rId4"/>
     <p:sldId id="256" r:id="rId5"/>
-    <p:sldId id="258" r:id="rId6"/>
-    <p:sldId id="259" r:id="rId7"/>
-    <p:sldId id="263" r:id="rId8"/>
-    <p:sldId id="261" r:id="rId9"/>
-    <p:sldId id="262" r:id="rId10"/>
+    <p:sldId id="265" r:id="rId6"/>
+    <p:sldId id="279" r:id="rId7"/>
+    <p:sldId id="270" r:id="rId8"/>
+    <p:sldId id="259" r:id="rId9"/>
+    <p:sldId id="264" r:id="rId10"/>
+    <p:sldId id="274" r:id="rId11"/>
+    <p:sldId id="275" r:id="rId12"/>
+    <p:sldId id="276" r:id="rId13"/>
+    <p:sldId id="277" r:id="rId14"/>
+    <p:sldId id="278" r:id="rId15"/>
+    <p:sldId id="268" r:id="rId16"/>
+    <p:sldId id="272" r:id="rId17"/>
+    <p:sldId id="261" r:id="rId18"/>
+    <p:sldId id="262" r:id="rId19"/>
+    <p:sldId id="263" r:id="rId20"/>
   </p:sldIdLst>
   <p:sldSz cx="9144000" cy="6858000" type="screen4x3"/>
   <p:notesSz cx="6858000" cy="9144000"/>
@@ -116,29 +126,6 @@
     </a:lvl9pPr>
   </p:defaultTextStyle>
   <p:extLst>
-    <p:ext uri="{521415D9-36F7-43E2-AB2F-B90AF26B5E84}">
-      <p14:sectionLst xmlns:p14="http://schemas.microsoft.com/office/powerpoint/2010/main">
-        <p14:section name="FrontMatter" id="{3CB2EFAD-0E2D-47C1-8FF1-B35CCE92634F}">
-          <p14:sldIdLst>
-            <p14:sldId id="257"/>
-            <p14:sldId id="256"/>
-          </p14:sldIdLst>
-        </p14:section>
-        <p14:section name="Section" id="{D3C808CB-8D15-4293-AC88-CA61EDCB4928}">
-          <p14:sldIdLst>
-            <p14:sldId id="258"/>
-            <p14:sldId id="259"/>
-            <p14:sldId id="263"/>
-          </p14:sldIdLst>
-        </p14:section>
-        <p14:section name="BackMatter" id="{ADD95ECC-A115-4712-BFFB-823B48F50B16}">
-          <p14:sldIdLst>
-            <p14:sldId id="261"/>
-            <p14:sldId id="262"/>
-          </p14:sldIdLst>
-        </p14:section>
-      </p14:sectionLst>
-    </p:ext>
     <p:ext uri="{EFAFB233-063F-42B5-8137-9DF3F51BA10A}">
       <p15:sldGuideLst xmlns:p15="http://schemas.microsoft.com/office/powerpoint/2012/main"/>
     </p:ext>
@@ -228,7 +215,7 @@
           <a:p>
             <a:fld id="{CECC7245-738C-4782-B27E-DEC2F82B4D28}" type="datetimeFigureOut">
               <a:rPr kumimoji="1" lang="ja-JP" altLang="en-US" smtClean="0"/>
-              <a:t>2017/7/1</a:t>
+              <a:t>2017/7/5</a:t>
             </a:fld>
             <a:endParaRPr kumimoji="1" lang="ja-JP" altLang="en-US"/>
           </a:p>
@@ -678,7 +665,7 @@
           <a:p>
             <a:fld id="{A4E0A381-1641-4E1C-AF50-732F9CF608C0}" type="datetime1">
               <a:rPr kumimoji="1" lang="ja-JP" altLang="en-US" smtClean="0"/>
-              <a:t>2017/7/1</a:t>
+              <a:t>2017/7/5</a:t>
             </a:fld>
             <a:endParaRPr kumimoji="1" lang="ja-JP" altLang="en-US"/>
           </a:p>
@@ -780,7 +767,7 @@
           <a:p>
             <a:fld id="{B19DF8F6-0428-4965-9A7E-15BDB3AB768B}" type="datetime1">
               <a:rPr kumimoji="1" lang="ja-JP" altLang="en-US" smtClean="0"/>
-              <a:t>2017/7/1</a:t>
+              <a:t>2017/7/5</a:t>
             </a:fld>
             <a:endParaRPr kumimoji="1" lang="ja-JP" altLang="en-US"/>
           </a:p>
@@ -983,7 +970,7 @@
           <a:p>
             <a:fld id="{1F1245EB-435D-4E22-AF4E-D677F3584AA9}" type="datetime1">
               <a:rPr kumimoji="1" lang="ja-JP" altLang="en-US" smtClean="0"/>
-              <a:t>2017/7/1</a:t>
+              <a:t>2017/7/5</a:t>
             </a:fld>
             <a:endParaRPr kumimoji="1" lang="ja-JP" altLang="en-US"/>
           </a:p>
@@ -1230,7 +1217,7 @@
           <a:p>
             <a:fld id="{941B4ABA-1782-447C-AF7A-AF0F16C91E34}" type="datetime1">
               <a:rPr kumimoji="1" lang="ja-JP" altLang="en-US" smtClean="0"/>
-              <a:t>2017/7/1</a:t>
+              <a:t>2017/7/5</a:t>
             </a:fld>
             <a:endParaRPr kumimoji="1" lang="ja-JP" altLang="en-US"/>
           </a:p>
@@ -1355,7 +1342,7 @@
           <a:p>
             <a:fld id="{17573B79-5AED-48A7-81F1-8AA95CB66188}" type="datetime1">
               <a:rPr kumimoji="1" lang="ja-JP" altLang="en-US" smtClean="0"/>
-              <a:t>2017/7/1</a:t>
+              <a:t>2017/7/5</a:t>
             </a:fld>
             <a:endParaRPr kumimoji="1" lang="ja-JP" altLang="en-US"/>
           </a:p>
@@ -1457,7 +1444,7 @@
           <a:p>
             <a:fld id="{368415C9-1300-4E36-B383-9A65D3CCF7B8}" type="datetime1">
               <a:rPr kumimoji="1" lang="ja-JP" altLang="en-US" smtClean="0"/>
-              <a:t>2017/7/1</a:t>
+              <a:t>2017/7/5</a:t>
             </a:fld>
             <a:endParaRPr kumimoji="1" lang="ja-JP" altLang="en-US"/>
           </a:p>
@@ -1794,7 +1781,7 @@
           <a:p>
             <a:fld id="{EB5E04F7-0228-4ABF-80F1-F0CC4D98EA8D}" type="datetime1">
               <a:rPr kumimoji="1" lang="ja-JP" altLang="en-US" smtClean="0"/>
-              <a:t>2017/7/1</a:t>
+              <a:t>2017/7/5</a:t>
             </a:fld>
             <a:endParaRPr kumimoji="1" lang="ja-JP" altLang="en-US"/>
           </a:p>
@@ -1927,7 +1914,7 @@
           <a:p>
             <a:fld id="{7453814D-DF59-452A-8C05-186DBCA3EF46}" type="datetime1">
               <a:rPr kumimoji="1" lang="ja-JP" altLang="en-US" smtClean="0"/>
-              <a:t>2017/7/1</a:t>
+              <a:t>2017/7/5</a:t>
             </a:fld>
             <a:endParaRPr kumimoji="1" lang="ja-JP" altLang="en-US"/>
           </a:p>
@@ -2029,7 +2016,7 @@
           <a:p>
             <a:fld id="{AFBF6112-5880-44DE-B4CF-725D40BA7FA6}" type="datetime1">
               <a:rPr kumimoji="1" lang="ja-JP" altLang="en-US" smtClean="0"/>
-              <a:t>2017/7/1</a:t>
+              <a:t>2017/7/5</a:t>
             </a:fld>
             <a:endParaRPr kumimoji="1" lang="ja-JP" altLang="en-US"/>
           </a:p>
@@ -2283,7 +2270,7 @@
           <a:p>
             <a:fld id="{5C11FA24-2FA4-4B4C-9449-68A61A9E22A1}" type="datetime1">
               <a:rPr kumimoji="1" lang="ja-JP" altLang="en-US" smtClean="0"/>
-              <a:t>2017/7/1</a:t>
+              <a:t>2017/7/5</a:t>
             </a:fld>
             <a:endParaRPr kumimoji="1" lang="ja-JP" altLang="en-US"/>
           </a:p>
@@ -2457,7 +2444,7 @@
           <a:p>
             <a:fld id="{BDADFCCA-FEA0-49F1-9EBA-64E79067CB58}" type="datetime1">
               <a:rPr kumimoji="1" lang="ja-JP" altLang="en-US" smtClean="0"/>
-              <a:t>2017/7/1</a:t>
+              <a:t>2017/7/5</a:t>
             </a:fld>
             <a:endParaRPr kumimoji="1" lang="ja-JP" altLang="en-US"/>
           </a:p>
@@ -2755,7 +2742,7 @@
           <a:p>
             <a:fld id="{67DC942D-6C63-4B5F-9446-D7E9D4D87299}" type="datetime1">
               <a:rPr kumimoji="1" lang="ja-JP" altLang="en-US" smtClean="0"/>
-              <a:t>2017/7/1</a:t>
+              <a:t>2017/7/5</a:t>
             </a:fld>
             <a:endParaRPr kumimoji="1" lang="ja-JP" altLang="en-US"/>
           </a:p>
@@ -2880,7 +2867,7 @@
           <a:p>
             <a:fld id="{E916A83F-A842-404F-9C3E-C000DEE830CA}" type="datetime1">
               <a:rPr kumimoji="1" lang="ja-JP" altLang="en-US" smtClean="0"/>
-              <a:t>2017/7/1</a:t>
+              <a:t>2017/7/5</a:t>
             </a:fld>
             <a:endParaRPr kumimoji="1" lang="ja-JP" altLang="en-US"/>
           </a:p>
@@ -3214,7 +3201,7 @@
           <a:p>
             <a:fld id="{CCFBACAE-24B0-4906-965E-3025536C118C}" type="datetime1">
               <a:rPr kumimoji="1" lang="ja-JP" altLang="en-US" smtClean="0"/>
-              <a:t>2017/7/1</a:t>
+              <a:t>2017/7/5</a:t>
             </a:fld>
             <a:endParaRPr kumimoji="1" lang="ja-JP" altLang="en-US"/>
           </a:p>
@@ -3875,7 +3862,7 @@
           <a:p>
             <a:fld id="{8FDB8EFE-12C1-4A49-9C9C-1FD30CC43618}" type="datetime1">
               <a:rPr kumimoji="1" lang="ja-JP" altLang="en-US" smtClean="0"/>
-              <a:t>2017/7/1</a:t>
+              <a:t>2017/7/5</a:t>
             </a:fld>
             <a:endParaRPr kumimoji="1" lang="ja-JP" altLang="en-US"/>
           </a:p>
@@ -4457,7 +4444,7 @@
           <a:p>
             <a:fld id="{EFA4CD22-692B-4F98-B853-79CBC3CDF84A}" type="datetime1">
               <a:rPr kumimoji="1" lang="ja-JP" altLang="en-US" smtClean="0"/>
-              <a:t>2017/7/1</a:t>
+              <a:t>2017/7/5</a:t>
             </a:fld>
             <a:endParaRPr kumimoji="1" lang="ja-JP" altLang="en-US"/>
           </a:p>
@@ -4888,64 +4875,117 @@
         <p:spPr/>
         <p:txBody>
           <a:bodyPr>
+            <a:noAutofit/>
+          </a:bodyPr>
+          <a:lstStyle/>
+          <a:p>
+            <a:r>
+              <a:rPr kumimoji="1" lang="ja-JP" altLang="en-US" sz="5400" dirty="0" smtClean="0"/>
+              <a:t>実画像を基にした</a:t>
+            </a:r>
+            <a:r>
+              <a:rPr kumimoji="1" lang="en-US" altLang="ja-JP" sz="5400" dirty="0" smtClean="0"/>
+              <a:t/>
+            </a:r>
+            <a:br>
+              <a:rPr kumimoji="1" lang="en-US" altLang="ja-JP" sz="5400" dirty="0" smtClean="0"/>
+            </a:br>
+            <a:r>
+              <a:rPr kumimoji="1" lang="ja-JP" altLang="en-US" sz="5400" dirty="0" smtClean="0"/>
+              <a:t>塗り絵画像の</a:t>
+            </a:r>
+            <a:r>
+              <a:rPr lang="ja-JP" altLang="en-US" sz="5400" dirty="0" smtClean="0"/>
+              <a:t>自動</a:t>
+            </a:r>
+            <a:r>
+              <a:rPr lang="ja-JP" altLang="en-US" sz="5400" dirty="0"/>
+              <a:t>生成</a:t>
+            </a:r>
+            <a:endParaRPr kumimoji="1" lang="ja-JP" altLang="en-US" sz="5400" dirty="0"/>
+          </a:p>
+        </p:txBody>
+      </p:sp>
+      <p:sp>
+        <p:nvSpPr>
+          <p:cNvPr id="3" name="サブタイトル 2"/>
+          <p:cNvSpPr>
+            <a:spLocks noGrp="1"/>
+          </p:cNvSpPr>
+          <p:nvPr>
+            <p:ph type="subTitle" idx="1"/>
+          </p:nvPr>
+        </p:nvSpPr>
+        <p:spPr>
+          <a:xfrm>
+            <a:off x="1143000" y="4042713"/>
+            <a:ext cx="6858000" cy="2123848"/>
+          </a:xfrm>
+        </p:spPr>
+        <p:txBody>
+          <a:bodyPr>
             <a:normAutofit/>
           </a:bodyPr>
           <a:lstStyle/>
           <a:p>
             <a:r>
-              <a:rPr kumimoji="1" lang="en-US" altLang="ja-JP" sz="4400" dirty="0" smtClean="0"/>
-              <a:t>Mean shift </a:t>
-            </a:r>
-            <a:r>
-              <a:rPr kumimoji="1" lang="ja-JP" altLang="en-US" sz="4400" dirty="0" smtClean="0"/>
-              <a:t>法と</a:t>
-            </a:r>
-            <a:r>
-              <a:rPr kumimoji="1" lang="en-US" altLang="ja-JP" sz="4400" dirty="0" smtClean="0"/>
-              <a:t/>
-            </a:r>
-            <a:br>
-              <a:rPr kumimoji="1" lang="en-US" altLang="ja-JP" sz="4400" dirty="0" smtClean="0"/>
-            </a:br>
-            <a:r>
-              <a:rPr kumimoji="1" lang="en-US" altLang="ja-JP" sz="4400" dirty="0" smtClean="0"/>
-              <a:t>k-means </a:t>
-            </a:r>
-            <a:r>
-              <a:rPr kumimoji="1" lang="ja-JP" altLang="en-US" sz="4400" dirty="0" smtClean="0"/>
-              <a:t>法を用いた</a:t>
-            </a:r>
-            <a:r>
-              <a:rPr kumimoji="1" lang="en-US" altLang="ja-JP" sz="4400" dirty="0" smtClean="0"/>
-              <a:t/>
-            </a:r>
-            <a:br>
-              <a:rPr kumimoji="1" lang="en-US" altLang="ja-JP" sz="4400" dirty="0" smtClean="0"/>
-            </a:br>
-            <a:r>
-              <a:rPr kumimoji="1" lang="ja-JP" altLang="en-US" sz="4400" dirty="0" smtClean="0"/>
-              <a:t>塗り絵問題の作成</a:t>
-            </a:r>
-            <a:endParaRPr kumimoji="1" lang="ja-JP" altLang="en-US" sz="4400" dirty="0"/>
-          </a:p>
-        </p:txBody>
-      </p:sp>
-      <p:sp>
-        <p:nvSpPr>
-          <p:cNvPr id="3" name="サブタイトル 2"/>
-          <p:cNvSpPr>
-            <a:spLocks noGrp="1"/>
-          </p:cNvSpPr>
-          <p:nvPr>
-            <p:ph type="subTitle" idx="1"/>
-          </p:nvPr>
-        </p:nvSpPr>
-        <p:spPr/>
-        <p:txBody>
-          <a:bodyPr/>
-          <a:lstStyle/>
-          <a:p>
-            <a:endParaRPr kumimoji="1" lang="ja-JP" altLang="en-US"/>
+              <a:rPr kumimoji="1" lang="ja-JP" altLang="en-US" sz="2000" dirty="0" smtClean="0"/>
+              <a:t>工学系研究科電気工学専攻</a:t>
+            </a:r>
+            <a:r>
+              <a:rPr lang="en-US" altLang="ja-JP" sz="2000" dirty="0"/>
+              <a:t> </a:t>
+            </a:r>
+            <a:r>
+              <a:rPr kumimoji="1" lang="ja-JP" altLang="en-US" sz="2000" dirty="0" smtClean="0"/>
+              <a:t>融合情報学</a:t>
+            </a:r>
+            <a:endParaRPr kumimoji="1" lang="en-US" altLang="ja-JP" sz="2000" dirty="0" smtClean="0"/>
+          </a:p>
+          <a:p>
+            <a:r>
+              <a:rPr kumimoji="1" lang="ja-JP" altLang="en-US" sz="2000" dirty="0" smtClean="0"/>
+              <a:t>齋藤研究室 </a:t>
+            </a:r>
+            <a:r>
+              <a:rPr kumimoji="1" lang="en-US" altLang="ja-JP" sz="1800" dirty="0" smtClean="0"/>
+              <a:t>37-176437</a:t>
+            </a:r>
+            <a:r>
+              <a:rPr kumimoji="1" lang="en-US" altLang="ja-JP" sz="2000" dirty="0" smtClean="0"/>
+              <a:t> </a:t>
+            </a:r>
+            <a:r>
+              <a:rPr kumimoji="1" lang="ja-JP" altLang="en-US" sz="2000" dirty="0" smtClean="0"/>
+              <a:t>是松優作</a:t>
+            </a:r>
+            <a:endParaRPr kumimoji="1" lang="en-US" altLang="ja-JP" sz="2000" dirty="0" smtClean="0"/>
+          </a:p>
+          <a:p>
+            <a:r>
+              <a:rPr kumimoji="1" lang="ja-JP" altLang="en-US" sz="2000" dirty="0" smtClean="0"/>
+              <a:t>情報理工学系研究科 システム情報学専攻</a:t>
+            </a:r>
+            <a:endParaRPr kumimoji="1" lang="en-US" altLang="ja-JP" sz="2000" dirty="0" smtClean="0"/>
+          </a:p>
+          <a:p>
+            <a:r>
+              <a:rPr kumimoji="1" lang="ja-JP" altLang="en-US" sz="2000" dirty="0" smtClean="0"/>
+              <a:t>猿渡研究室 </a:t>
+            </a:r>
+            <a:r>
+              <a:rPr kumimoji="1" lang="en-US" altLang="ja-JP" sz="1800" dirty="0" smtClean="0"/>
+              <a:t>48-176322</a:t>
+            </a:r>
+            <a:r>
+              <a:rPr kumimoji="1" lang="en-US" altLang="ja-JP" sz="2000" dirty="0" smtClean="0"/>
+              <a:t> </a:t>
+            </a:r>
+            <a:r>
+              <a:rPr kumimoji="1" lang="ja-JP" altLang="en-US" sz="2000" dirty="0" smtClean="0"/>
+              <a:t>最上伸一</a:t>
+            </a:r>
+            <a:endParaRPr kumimoji="1" lang="ja-JP" altLang="en-US" sz="2000" dirty="0"/>
           </a:p>
         </p:txBody>
       </p:sp>
@@ -4966,7 +5006,7 @@
           <a:p>
             <a:fld id="{F719F4A1-6767-4E72-A39C-0123BA7CE47C}" type="datetime1">
               <a:rPr kumimoji="1" lang="ja-JP" altLang="en-US" smtClean="0"/>
-              <a:t>2017/7/1</a:t>
+              <a:t>2017/7/5</a:t>
             </a:fld>
             <a:endParaRPr kumimoji="1" lang="ja-JP" altLang="en-US"/>
           </a:p>
@@ -5024,6 +5064,1727 @@
   <p:clrMapOvr>
     <a:masterClrMapping/>
   </p:clrMapOvr>
+  <p:timing>
+    <p:tnLst>
+      <p:par>
+        <p:cTn id="1" dur="indefinite" restart="never" nodeType="tmRoot"/>
+      </p:par>
+    </p:tnLst>
+  </p:timing>
+</p:sld>
+</file>
+
+<file path=ppt/slides/slide10.xml><?xml version="1.0" encoding="utf-8"?>
+<p:sld xmlns:a="http://schemas.openxmlformats.org/drawingml/2006/main" xmlns:r="http://schemas.openxmlformats.org/officeDocument/2006/relationships" xmlns:p="http://schemas.openxmlformats.org/presentationml/2006/main">
+  <p:cSld>
+    <p:spTree>
+      <p:nvGrpSpPr>
+        <p:cNvPr id="1" name=""/>
+        <p:cNvGrpSpPr/>
+        <p:nvPr/>
+      </p:nvGrpSpPr>
+      <p:grpSpPr>
+        <a:xfrm>
+          <a:off x="0" y="0"/>
+          <a:ext cx="0" cy="0"/>
+          <a:chOff x="0" y="0"/>
+          <a:chExt cx="0" cy="0"/>
+        </a:xfrm>
+      </p:grpSpPr>
+      <p:sp>
+        <p:nvSpPr>
+          <p:cNvPr id="12" name="タイトル 11"/>
+          <p:cNvSpPr>
+            <a:spLocks noGrp="1"/>
+          </p:cNvSpPr>
+          <p:nvPr>
+            <p:ph type="title"/>
+          </p:nvPr>
+        </p:nvSpPr>
+        <p:spPr/>
+        <p:txBody>
+          <a:bodyPr>
+            <a:normAutofit/>
+          </a:bodyPr>
+          <a:lstStyle/>
+          <a:p>
+            <a:r>
+              <a:rPr kumimoji="1" lang="ja-JP" altLang="en-US" dirty="0" smtClean="0"/>
+              <a:t>実験結果（塗り絵問題</a:t>
+            </a:r>
+            <a:r>
+              <a:rPr kumimoji="1" lang="ja-JP" altLang="en-US" dirty="0" smtClean="0"/>
+              <a:t>画像，再掲）</a:t>
+            </a:r>
+            <a:endParaRPr kumimoji="1" lang="ja-JP" altLang="en-US" dirty="0"/>
+          </a:p>
+        </p:txBody>
+      </p:sp>
+      <p:sp>
+        <p:nvSpPr>
+          <p:cNvPr id="7" name="日付プレースホルダー 6"/>
+          <p:cNvSpPr>
+            <a:spLocks noGrp="1"/>
+          </p:cNvSpPr>
+          <p:nvPr>
+            <p:ph type="dt" sz="half" idx="10"/>
+          </p:nvPr>
+        </p:nvSpPr>
+        <p:spPr/>
+        <p:txBody>
+          <a:bodyPr/>
+          <a:lstStyle/>
+          <a:p>
+            <a:fld id="{B73BE00C-7ADA-4FCD-AAB2-CF527D6B0C23}" type="datetime1">
+              <a:rPr kumimoji="1" lang="ja-JP" altLang="en-US" smtClean="0"/>
+              <a:t>2017/7/5</a:t>
+            </a:fld>
+            <a:endParaRPr kumimoji="1" lang="ja-JP" altLang="en-US"/>
+          </a:p>
+        </p:txBody>
+      </p:sp>
+      <p:sp>
+        <p:nvSpPr>
+          <p:cNvPr id="8" name="フッター プレースホルダー 7"/>
+          <p:cNvSpPr>
+            <a:spLocks noGrp="1"/>
+          </p:cNvSpPr>
+          <p:nvPr>
+            <p:ph type="ftr" sz="quarter" idx="11"/>
+          </p:nvPr>
+        </p:nvSpPr>
+        <p:spPr/>
+        <p:txBody>
+          <a:bodyPr/>
+          <a:lstStyle/>
+          <a:p>
+            <a:endParaRPr kumimoji="1" lang="ja-JP" altLang="en-US"/>
+          </a:p>
+        </p:txBody>
+      </p:sp>
+      <p:sp>
+        <p:nvSpPr>
+          <p:cNvPr id="9" name="スライド番号プレースホルダー 8"/>
+          <p:cNvSpPr>
+            <a:spLocks noGrp="1"/>
+          </p:cNvSpPr>
+          <p:nvPr>
+            <p:ph type="sldNum" sz="quarter" idx="12"/>
+          </p:nvPr>
+        </p:nvSpPr>
+        <p:spPr/>
+        <p:txBody>
+          <a:bodyPr/>
+          <a:lstStyle/>
+          <a:p>
+            <a:fld id="{1833CB71-1218-46DA-97FE-FEE1D40BAC88}" type="slidenum">
+              <a:rPr kumimoji="1" lang="ja-JP" altLang="en-US" smtClean="0"/>
+              <a:t>10</a:t>
+            </a:fld>
+            <a:endParaRPr kumimoji="1" lang="ja-JP" altLang="en-US"/>
+          </a:p>
+        </p:txBody>
+      </p:sp>
+      <p:pic>
+        <p:nvPicPr>
+          <p:cNvPr id="2" name="図 1"/>
+          <p:cNvPicPr>
+            <a:picLocks noChangeAspect="1"/>
+          </p:cNvPicPr>
+          <p:nvPr/>
+        </p:nvPicPr>
+        <p:blipFill>
+          <a:blip r:embed="rId2">
+            <a:extLst>
+              <a:ext uri="{28A0092B-C50C-407E-A947-70E740481C1C}">
+                <a14:useLocalDpi xmlns:a14="http://schemas.microsoft.com/office/drawing/2010/main" val="0"/>
+              </a:ext>
+            </a:extLst>
+          </a:blip>
+          <a:stretch>
+            <a:fillRect/>
+          </a:stretch>
+        </p:blipFill>
+        <p:spPr>
+          <a:xfrm>
+            <a:off x="799368" y="1071646"/>
+            <a:ext cx="7545263" cy="5040000"/>
+          </a:xfrm>
+          <a:prstGeom prst="rect">
+            <a:avLst/>
+          </a:prstGeom>
+        </p:spPr>
+      </p:pic>
+    </p:spTree>
+    <p:extLst>
+      <p:ext uri="{BB962C8B-B14F-4D97-AF65-F5344CB8AC3E}">
+        <p14:creationId xmlns:p14="http://schemas.microsoft.com/office/powerpoint/2010/main" val="71476503"/>
+      </p:ext>
+    </p:extLst>
+  </p:cSld>
+  <p:clrMapOvr>
+    <a:masterClrMapping/>
+  </p:clrMapOvr>
+  <p:timing>
+    <p:tnLst>
+      <p:par>
+        <p:cTn id="1" dur="indefinite" restart="never" nodeType="tmRoot"/>
+      </p:par>
+    </p:tnLst>
+  </p:timing>
+</p:sld>
+</file>
+
+<file path=ppt/slides/slide11.xml><?xml version="1.0" encoding="utf-8"?>
+<p:sld xmlns:a="http://schemas.openxmlformats.org/drawingml/2006/main" xmlns:r="http://schemas.openxmlformats.org/officeDocument/2006/relationships" xmlns:p="http://schemas.openxmlformats.org/presentationml/2006/main">
+  <p:cSld>
+    <p:spTree>
+      <p:nvGrpSpPr>
+        <p:cNvPr id="1" name=""/>
+        <p:cNvGrpSpPr/>
+        <p:nvPr/>
+      </p:nvGrpSpPr>
+      <p:grpSpPr>
+        <a:xfrm>
+          <a:off x="0" y="0"/>
+          <a:ext cx="0" cy="0"/>
+          <a:chOff x="0" y="0"/>
+          <a:chExt cx="0" cy="0"/>
+        </a:xfrm>
+      </p:grpSpPr>
+      <p:sp>
+        <p:nvSpPr>
+          <p:cNvPr id="12" name="タイトル 11"/>
+          <p:cNvSpPr>
+            <a:spLocks noGrp="1"/>
+          </p:cNvSpPr>
+          <p:nvPr>
+            <p:ph type="title"/>
+          </p:nvPr>
+        </p:nvSpPr>
+        <p:spPr/>
+        <p:txBody>
+          <a:bodyPr/>
+          <a:lstStyle/>
+          <a:p>
+            <a:r>
+              <a:rPr kumimoji="1" lang="ja-JP" altLang="en-US" dirty="0" smtClean="0"/>
+              <a:t>実験結果（塗りつぶしてみた）</a:t>
+            </a:r>
+            <a:endParaRPr kumimoji="1" lang="ja-JP" altLang="en-US" dirty="0"/>
+          </a:p>
+        </p:txBody>
+      </p:sp>
+      <p:sp>
+        <p:nvSpPr>
+          <p:cNvPr id="7" name="日付プレースホルダー 6"/>
+          <p:cNvSpPr>
+            <a:spLocks noGrp="1"/>
+          </p:cNvSpPr>
+          <p:nvPr>
+            <p:ph type="dt" sz="half" idx="10"/>
+          </p:nvPr>
+        </p:nvSpPr>
+        <p:spPr/>
+        <p:txBody>
+          <a:bodyPr/>
+          <a:lstStyle/>
+          <a:p>
+            <a:fld id="{B73BE00C-7ADA-4FCD-AAB2-CF527D6B0C23}" type="datetime1">
+              <a:rPr kumimoji="1" lang="ja-JP" altLang="en-US" smtClean="0"/>
+              <a:t>2017/7/5</a:t>
+            </a:fld>
+            <a:endParaRPr kumimoji="1" lang="ja-JP" altLang="en-US"/>
+          </a:p>
+        </p:txBody>
+      </p:sp>
+      <p:sp>
+        <p:nvSpPr>
+          <p:cNvPr id="8" name="フッター プレースホルダー 7"/>
+          <p:cNvSpPr>
+            <a:spLocks noGrp="1"/>
+          </p:cNvSpPr>
+          <p:nvPr>
+            <p:ph type="ftr" sz="quarter" idx="11"/>
+          </p:nvPr>
+        </p:nvSpPr>
+        <p:spPr/>
+        <p:txBody>
+          <a:bodyPr/>
+          <a:lstStyle/>
+          <a:p>
+            <a:endParaRPr kumimoji="1" lang="ja-JP" altLang="en-US"/>
+          </a:p>
+        </p:txBody>
+      </p:sp>
+      <p:sp>
+        <p:nvSpPr>
+          <p:cNvPr id="9" name="スライド番号プレースホルダー 8"/>
+          <p:cNvSpPr>
+            <a:spLocks noGrp="1"/>
+          </p:cNvSpPr>
+          <p:nvPr>
+            <p:ph type="sldNum" sz="quarter" idx="12"/>
+          </p:nvPr>
+        </p:nvSpPr>
+        <p:spPr/>
+        <p:txBody>
+          <a:bodyPr/>
+          <a:lstStyle/>
+          <a:p>
+            <a:fld id="{1833CB71-1218-46DA-97FE-FEE1D40BAC88}" type="slidenum">
+              <a:rPr kumimoji="1" lang="ja-JP" altLang="en-US" smtClean="0"/>
+              <a:t>11</a:t>
+            </a:fld>
+            <a:endParaRPr kumimoji="1" lang="ja-JP" altLang="en-US"/>
+          </a:p>
+        </p:txBody>
+      </p:sp>
+      <p:pic>
+        <p:nvPicPr>
+          <p:cNvPr id="3" name="図 2"/>
+          <p:cNvPicPr>
+            <a:picLocks noChangeAspect="1"/>
+          </p:cNvPicPr>
+          <p:nvPr/>
+        </p:nvPicPr>
+        <p:blipFill>
+          <a:blip r:embed="rId2">
+            <a:extLst>
+              <a:ext uri="{28A0092B-C50C-407E-A947-70E740481C1C}">
+                <a14:useLocalDpi xmlns:a14="http://schemas.microsoft.com/office/drawing/2010/main" val="0"/>
+              </a:ext>
+            </a:extLst>
+          </a:blip>
+          <a:stretch>
+            <a:fillRect/>
+          </a:stretch>
+        </p:blipFill>
+        <p:spPr>
+          <a:xfrm>
+            <a:off x="799368" y="1071646"/>
+            <a:ext cx="7545263" cy="5040000"/>
+          </a:xfrm>
+          <a:prstGeom prst="rect">
+            <a:avLst/>
+          </a:prstGeom>
+        </p:spPr>
+      </p:pic>
+      <p:sp>
+        <p:nvSpPr>
+          <p:cNvPr id="4" name="テキスト ボックス 3"/>
+          <p:cNvSpPr txBox="1"/>
+          <p:nvPr/>
+        </p:nvSpPr>
+        <p:spPr>
+          <a:xfrm>
+            <a:off x="5079686" y="6117769"/>
+            <a:ext cx="4041747" cy="369332"/>
+          </a:xfrm>
+          <a:prstGeom prst="rect">
+            <a:avLst/>
+          </a:prstGeom>
+          <a:noFill/>
+        </p:spPr>
+        <p:txBody>
+          <a:bodyPr wrap="none" rtlCol="0">
+            <a:spAutoFit/>
+          </a:bodyPr>
+          <a:lstStyle/>
+          <a:p>
+            <a:r>
+              <a:rPr kumimoji="1" lang="en-US" altLang="ja-JP" dirty="0" smtClean="0"/>
+              <a:t>※ Windows </a:t>
+            </a:r>
+            <a:r>
+              <a:rPr kumimoji="1" lang="ja-JP" altLang="en-US" dirty="0" smtClean="0"/>
+              <a:t>の ペイント ソフトを使用</a:t>
+            </a:r>
+            <a:endParaRPr kumimoji="1" lang="ja-JP" altLang="en-US" dirty="0"/>
+          </a:p>
+        </p:txBody>
+      </p:sp>
+    </p:spTree>
+    <p:extLst>
+      <p:ext uri="{BB962C8B-B14F-4D97-AF65-F5344CB8AC3E}">
+        <p14:creationId xmlns:p14="http://schemas.microsoft.com/office/powerpoint/2010/main" val="1775236481"/>
+      </p:ext>
+    </p:extLst>
+  </p:cSld>
+  <p:clrMapOvr>
+    <a:masterClrMapping/>
+  </p:clrMapOvr>
+  <p:timing>
+    <p:tnLst>
+      <p:par>
+        <p:cTn id="1" dur="indefinite" restart="never" nodeType="tmRoot"/>
+      </p:par>
+    </p:tnLst>
+  </p:timing>
+</p:sld>
+</file>
+
+<file path=ppt/slides/slide12.xml><?xml version="1.0" encoding="utf-8"?>
+<p:sld xmlns:a="http://schemas.openxmlformats.org/drawingml/2006/main" xmlns:r="http://schemas.openxmlformats.org/officeDocument/2006/relationships" xmlns:p="http://schemas.openxmlformats.org/presentationml/2006/main">
+  <p:cSld>
+    <p:spTree>
+      <p:nvGrpSpPr>
+        <p:cNvPr id="1" name=""/>
+        <p:cNvGrpSpPr/>
+        <p:nvPr/>
+      </p:nvGrpSpPr>
+      <p:grpSpPr>
+        <a:xfrm>
+          <a:off x="0" y="0"/>
+          <a:ext cx="0" cy="0"/>
+          <a:chOff x="0" y="0"/>
+          <a:chExt cx="0" cy="0"/>
+        </a:xfrm>
+      </p:grpSpPr>
+      <p:sp>
+        <p:nvSpPr>
+          <p:cNvPr id="12" name="タイトル 11"/>
+          <p:cNvSpPr>
+            <a:spLocks noGrp="1"/>
+          </p:cNvSpPr>
+          <p:nvPr>
+            <p:ph type="title"/>
+          </p:nvPr>
+        </p:nvSpPr>
+        <p:spPr/>
+        <p:txBody>
+          <a:bodyPr/>
+          <a:lstStyle/>
+          <a:p>
+            <a:r>
+              <a:rPr kumimoji="1" lang="ja-JP" altLang="en-US" dirty="0" smtClean="0"/>
+              <a:t>実験結果（塗りつぶしてみた）</a:t>
+            </a:r>
+            <a:endParaRPr kumimoji="1" lang="ja-JP" altLang="en-US" dirty="0"/>
+          </a:p>
+        </p:txBody>
+      </p:sp>
+      <p:sp>
+        <p:nvSpPr>
+          <p:cNvPr id="7" name="日付プレースホルダー 6"/>
+          <p:cNvSpPr>
+            <a:spLocks noGrp="1"/>
+          </p:cNvSpPr>
+          <p:nvPr>
+            <p:ph type="dt" sz="half" idx="10"/>
+          </p:nvPr>
+        </p:nvSpPr>
+        <p:spPr/>
+        <p:txBody>
+          <a:bodyPr/>
+          <a:lstStyle/>
+          <a:p>
+            <a:fld id="{B73BE00C-7ADA-4FCD-AAB2-CF527D6B0C23}" type="datetime1">
+              <a:rPr kumimoji="1" lang="ja-JP" altLang="en-US" smtClean="0"/>
+              <a:t>2017/7/5</a:t>
+            </a:fld>
+            <a:endParaRPr kumimoji="1" lang="ja-JP" altLang="en-US"/>
+          </a:p>
+        </p:txBody>
+      </p:sp>
+      <p:sp>
+        <p:nvSpPr>
+          <p:cNvPr id="8" name="フッター プレースホルダー 7"/>
+          <p:cNvSpPr>
+            <a:spLocks noGrp="1"/>
+          </p:cNvSpPr>
+          <p:nvPr>
+            <p:ph type="ftr" sz="quarter" idx="11"/>
+          </p:nvPr>
+        </p:nvSpPr>
+        <p:spPr/>
+        <p:txBody>
+          <a:bodyPr/>
+          <a:lstStyle/>
+          <a:p>
+            <a:endParaRPr kumimoji="1" lang="ja-JP" altLang="en-US"/>
+          </a:p>
+        </p:txBody>
+      </p:sp>
+      <p:sp>
+        <p:nvSpPr>
+          <p:cNvPr id="9" name="スライド番号プレースホルダー 8"/>
+          <p:cNvSpPr>
+            <a:spLocks noGrp="1"/>
+          </p:cNvSpPr>
+          <p:nvPr>
+            <p:ph type="sldNum" sz="quarter" idx="12"/>
+          </p:nvPr>
+        </p:nvSpPr>
+        <p:spPr/>
+        <p:txBody>
+          <a:bodyPr/>
+          <a:lstStyle/>
+          <a:p>
+            <a:fld id="{1833CB71-1218-46DA-97FE-FEE1D40BAC88}" type="slidenum">
+              <a:rPr kumimoji="1" lang="ja-JP" altLang="en-US" smtClean="0"/>
+              <a:t>12</a:t>
+            </a:fld>
+            <a:endParaRPr kumimoji="1" lang="ja-JP" altLang="en-US"/>
+          </a:p>
+        </p:txBody>
+      </p:sp>
+      <p:sp>
+        <p:nvSpPr>
+          <p:cNvPr id="4" name="テキスト ボックス 3"/>
+          <p:cNvSpPr txBox="1"/>
+          <p:nvPr/>
+        </p:nvSpPr>
+        <p:spPr>
+          <a:xfrm>
+            <a:off x="5079686" y="6117769"/>
+            <a:ext cx="4041747" cy="369332"/>
+          </a:xfrm>
+          <a:prstGeom prst="rect">
+            <a:avLst/>
+          </a:prstGeom>
+          <a:noFill/>
+        </p:spPr>
+        <p:txBody>
+          <a:bodyPr wrap="none" rtlCol="0">
+            <a:spAutoFit/>
+          </a:bodyPr>
+          <a:lstStyle/>
+          <a:p>
+            <a:r>
+              <a:rPr kumimoji="1" lang="en-US" altLang="ja-JP" dirty="0" smtClean="0"/>
+              <a:t>※ Windows </a:t>
+            </a:r>
+            <a:r>
+              <a:rPr kumimoji="1" lang="ja-JP" altLang="en-US" dirty="0" smtClean="0"/>
+              <a:t>の ペイント ソフトを使用</a:t>
+            </a:r>
+            <a:endParaRPr kumimoji="1" lang="ja-JP" altLang="en-US" dirty="0"/>
+          </a:p>
+        </p:txBody>
+      </p:sp>
+      <p:pic>
+        <p:nvPicPr>
+          <p:cNvPr id="2" name="図 1"/>
+          <p:cNvPicPr>
+            <a:picLocks noChangeAspect="1"/>
+          </p:cNvPicPr>
+          <p:nvPr/>
+        </p:nvPicPr>
+        <p:blipFill>
+          <a:blip r:embed="rId2">
+            <a:extLst>
+              <a:ext uri="{28A0092B-C50C-407E-A947-70E740481C1C}">
+                <a14:useLocalDpi xmlns:a14="http://schemas.microsoft.com/office/drawing/2010/main" val="0"/>
+              </a:ext>
+            </a:extLst>
+          </a:blip>
+          <a:stretch>
+            <a:fillRect/>
+          </a:stretch>
+        </p:blipFill>
+        <p:spPr>
+          <a:xfrm>
+            <a:off x="799368" y="1074882"/>
+            <a:ext cx="7545263" cy="5040000"/>
+          </a:xfrm>
+          <a:prstGeom prst="rect">
+            <a:avLst/>
+          </a:prstGeom>
+        </p:spPr>
+      </p:pic>
+    </p:spTree>
+    <p:extLst>
+      <p:ext uri="{BB962C8B-B14F-4D97-AF65-F5344CB8AC3E}">
+        <p14:creationId xmlns:p14="http://schemas.microsoft.com/office/powerpoint/2010/main" val="2187199442"/>
+      </p:ext>
+    </p:extLst>
+  </p:cSld>
+  <p:clrMapOvr>
+    <a:masterClrMapping/>
+  </p:clrMapOvr>
+  <p:timing>
+    <p:tnLst>
+      <p:par>
+        <p:cTn id="1" dur="indefinite" restart="never" nodeType="tmRoot"/>
+      </p:par>
+    </p:tnLst>
+  </p:timing>
+</p:sld>
+</file>
+
+<file path=ppt/slides/slide13.xml><?xml version="1.0" encoding="utf-8"?>
+<p:sld xmlns:a="http://schemas.openxmlformats.org/drawingml/2006/main" xmlns:r="http://schemas.openxmlformats.org/officeDocument/2006/relationships" xmlns:p="http://schemas.openxmlformats.org/presentationml/2006/main">
+  <p:cSld>
+    <p:spTree>
+      <p:nvGrpSpPr>
+        <p:cNvPr id="1" name=""/>
+        <p:cNvGrpSpPr/>
+        <p:nvPr/>
+      </p:nvGrpSpPr>
+      <p:grpSpPr>
+        <a:xfrm>
+          <a:off x="0" y="0"/>
+          <a:ext cx="0" cy="0"/>
+          <a:chOff x="0" y="0"/>
+          <a:chExt cx="0" cy="0"/>
+        </a:xfrm>
+      </p:grpSpPr>
+      <p:sp>
+        <p:nvSpPr>
+          <p:cNvPr id="2" name="タイトル 1"/>
+          <p:cNvSpPr>
+            <a:spLocks noGrp="1"/>
+          </p:cNvSpPr>
+          <p:nvPr>
+            <p:ph type="title"/>
+          </p:nvPr>
+        </p:nvSpPr>
+        <p:spPr/>
+        <p:txBody>
+          <a:bodyPr/>
+          <a:lstStyle/>
+          <a:p>
+            <a:r>
+              <a:rPr lang="ja-JP" altLang="en-US" dirty="0"/>
+              <a:t>考察</a:t>
+            </a:r>
+            <a:endParaRPr kumimoji="1" lang="ja-JP" altLang="en-US" dirty="0"/>
+          </a:p>
+        </p:txBody>
+      </p:sp>
+      <p:sp>
+        <p:nvSpPr>
+          <p:cNvPr id="3" name="コンテンツ プレースホルダー 2"/>
+          <p:cNvSpPr>
+            <a:spLocks noGrp="1"/>
+          </p:cNvSpPr>
+          <p:nvPr>
+            <p:ph idx="1"/>
+          </p:nvPr>
+        </p:nvSpPr>
+        <p:spPr/>
+        <p:txBody>
+          <a:bodyPr/>
+          <a:lstStyle/>
+          <a:p>
+            <a:r>
+              <a:rPr lang="ja-JP" altLang="en-US" dirty="0" smtClean="0"/>
+              <a:t>パラメータの選択</a:t>
+            </a:r>
+            <a:endParaRPr lang="en-US" altLang="ja-JP" dirty="0" smtClean="0"/>
+          </a:p>
+          <a:p>
+            <a:pPr lvl="1"/>
+            <a:r>
+              <a:rPr lang="ja-JP" altLang="en-US" dirty="0" smtClean="0"/>
+              <a:t>調整可能なパラメータがいくつか存在</a:t>
+            </a:r>
+            <a:endParaRPr lang="en-US" altLang="ja-JP" dirty="0" smtClean="0"/>
+          </a:p>
+          <a:p>
+            <a:pPr lvl="2"/>
+            <a:r>
+              <a:rPr lang="en-US" altLang="ja-JP" dirty="0" smtClean="0"/>
+              <a:t>Mean shift</a:t>
+            </a:r>
+            <a:r>
+              <a:rPr lang="ja-JP" altLang="en-US" dirty="0" smtClean="0"/>
+              <a:t>：位置空間窓半径・色空間窓半径</a:t>
+            </a:r>
+            <a:endParaRPr lang="en-US" altLang="ja-JP" dirty="0" smtClean="0"/>
+          </a:p>
+          <a:p>
+            <a:pPr lvl="2"/>
+            <a:r>
+              <a:rPr lang="en-US" altLang="ja-JP" dirty="0"/>
+              <a:t>k</a:t>
+            </a:r>
+            <a:r>
+              <a:rPr lang="en-US" altLang="ja-JP" dirty="0" smtClean="0"/>
+              <a:t>-means</a:t>
+            </a:r>
+            <a:r>
+              <a:rPr lang="ja-JP" altLang="en-US" dirty="0" smtClean="0"/>
+              <a:t>：クラスタ数</a:t>
+            </a:r>
+            <a:endParaRPr lang="en-US" altLang="ja-JP" dirty="0" smtClean="0"/>
+          </a:p>
+          <a:p>
+            <a:pPr lvl="1"/>
+            <a:r>
+              <a:rPr lang="ja-JP" altLang="en-US" dirty="0" smtClean="0"/>
+              <a:t>丁度良い問題を作成するためにはある程度のパラメータチューニングが必要</a:t>
+            </a:r>
+            <a:endParaRPr lang="en-US" altLang="ja-JP" dirty="0" smtClean="0"/>
+          </a:p>
+          <a:p>
+            <a:endParaRPr kumimoji="1" lang="en-US" altLang="ja-JP" dirty="0" smtClean="0"/>
+          </a:p>
+          <a:p>
+            <a:r>
+              <a:rPr kumimoji="1" lang="ja-JP" altLang="en-US" dirty="0" smtClean="0"/>
+              <a:t>微小な閉領域の存在</a:t>
+            </a:r>
+            <a:endParaRPr kumimoji="1" lang="en-US" altLang="ja-JP" dirty="0" smtClean="0"/>
+          </a:p>
+          <a:p>
+            <a:pPr lvl="1"/>
+            <a:r>
+              <a:rPr lang="en-US" altLang="ja-JP" dirty="0" smtClean="0"/>
+              <a:t>Mean shift </a:t>
+            </a:r>
+            <a:r>
+              <a:rPr lang="ja-JP" altLang="en-US" dirty="0" smtClean="0"/>
+              <a:t>法や </a:t>
+            </a:r>
+            <a:r>
+              <a:rPr lang="en-US" altLang="ja-JP" dirty="0" smtClean="0"/>
+              <a:t>k-means </a:t>
+            </a:r>
+            <a:r>
+              <a:rPr lang="ja-JP" altLang="en-US" dirty="0" smtClean="0"/>
+              <a:t>法でも消せない</a:t>
+            </a:r>
+            <a:endParaRPr lang="en-US" altLang="ja-JP" dirty="0" smtClean="0"/>
+          </a:p>
+          <a:p>
+            <a:pPr lvl="1"/>
+            <a:r>
+              <a:rPr kumimoji="1" lang="ja-JP" altLang="en-US" dirty="0" smtClean="0"/>
+              <a:t>モルフォロジなどを試みたが，画像が粗くなる</a:t>
+            </a:r>
+            <a:endParaRPr kumimoji="1" lang="en-US" altLang="ja-JP" dirty="0" smtClean="0"/>
+          </a:p>
+        </p:txBody>
+      </p:sp>
+      <p:sp>
+        <p:nvSpPr>
+          <p:cNvPr id="7" name="日付プレースホルダー 6"/>
+          <p:cNvSpPr>
+            <a:spLocks noGrp="1"/>
+          </p:cNvSpPr>
+          <p:nvPr>
+            <p:ph type="dt" sz="half" idx="10"/>
+          </p:nvPr>
+        </p:nvSpPr>
+        <p:spPr/>
+        <p:txBody>
+          <a:bodyPr/>
+          <a:lstStyle/>
+          <a:p>
+            <a:fld id="{B73BE00C-7ADA-4FCD-AAB2-CF527D6B0C23}" type="datetime1">
+              <a:rPr kumimoji="1" lang="ja-JP" altLang="en-US" smtClean="0"/>
+              <a:t>2017/7/5</a:t>
+            </a:fld>
+            <a:endParaRPr kumimoji="1" lang="ja-JP" altLang="en-US"/>
+          </a:p>
+        </p:txBody>
+      </p:sp>
+      <p:sp>
+        <p:nvSpPr>
+          <p:cNvPr id="8" name="フッター プレースホルダー 7"/>
+          <p:cNvSpPr>
+            <a:spLocks noGrp="1"/>
+          </p:cNvSpPr>
+          <p:nvPr>
+            <p:ph type="ftr" sz="quarter" idx="11"/>
+          </p:nvPr>
+        </p:nvSpPr>
+        <p:spPr/>
+        <p:txBody>
+          <a:bodyPr/>
+          <a:lstStyle/>
+          <a:p>
+            <a:endParaRPr kumimoji="1" lang="ja-JP" altLang="en-US"/>
+          </a:p>
+        </p:txBody>
+      </p:sp>
+      <p:sp>
+        <p:nvSpPr>
+          <p:cNvPr id="9" name="スライド番号プレースホルダー 8"/>
+          <p:cNvSpPr>
+            <a:spLocks noGrp="1"/>
+          </p:cNvSpPr>
+          <p:nvPr>
+            <p:ph type="sldNum" sz="quarter" idx="12"/>
+          </p:nvPr>
+        </p:nvSpPr>
+        <p:spPr/>
+        <p:txBody>
+          <a:bodyPr/>
+          <a:lstStyle/>
+          <a:p>
+            <a:fld id="{1833CB71-1218-46DA-97FE-FEE1D40BAC88}" type="slidenum">
+              <a:rPr kumimoji="1" lang="ja-JP" altLang="en-US" smtClean="0"/>
+              <a:t>13</a:t>
+            </a:fld>
+            <a:endParaRPr kumimoji="1" lang="ja-JP" altLang="en-US"/>
+          </a:p>
+        </p:txBody>
+      </p:sp>
+    </p:spTree>
+    <p:extLst>
+      <p:ext uri="{BB962C8B-B14F-4D97-AF65-F5344CB8AC3E}">
+        <p14:creationId xmlns:p14="http://schemas.microsoft.com/office/powerpoint/2010/main" val="764106769"/>
+      </p:ext>
+    </p:extLst>
+  </p:cSld>
+  <p:clrMapOvr>
+    <a:masterClrMapping/>
+  </p:clrMapOvr>
+  <p:timing>
+    <p:tnLst>
+      <p:par>
+        <p:cTn id="1" dur="indefinite" restart="never" nodeType="tmRoot"/>
+      </p:par>
+    </p:tnLst>
+  </p:timing>
+</p:sld>
+</file>
+
+<file path=ppt/slides/slide14.xml><?xml version="1.0" encoding="utf-8"?>
+<p:sld xmlns:a="http://schemas.openxmlformats.org/drawingml/2006/main" xmlns:r="http://schemas.openxmlformats.org/officeDocument/2006/relationships" xmlns:p="http://schemas.openxmlformats.org/presentationml/2006/main">
+  <p:cSld>
+    <p:spTree>
+      <p:nvGrpSpPr>
+        <p:cNvPr id="1" name=""/>
+        <p:cNvGrpSpPr/>
+        <p:nvPr/>
+      </p:nvGrpSpPr>
+      <p:grpSpPr>
+        <a:xfrm>
+          <a:off x="0" y="0"/>
+          <a:ext cx="0" cy="0"/>
+          <a:chOff x="0" y="0"/>
+          <a:chExt cx="0" cy="0"/>
+        </a:xfrm>
+      </p:grpSpPr>
+      <p:sp>
+        <p:nvSpPr>
+          <p:cNvPr id="2" name="タイトル 1"/>
+          <p:cNvSpPr>
+            <a:spLocks noGrp="1"/>
+          </p:cNvSpPr>
+          <p:nvPr>
+            <p:ph type="title"/>
+          </p:nvPr>
+        </p:nvSpPr>
+        <p:spPr/>
+        <p:txBody>
+          <a:bodyPr/>
+          <a:lstStyle/>
+          <a:p>
+            <a:r>
+              <a:rPr lang="ja-JP" altLang="en-US" dirty="0" smtClean="0"/>
+              <a:t>まと</a:t>
+            </a:r>
+            <a:r>
+              <a:rPr lang="ja-JP" altLang="en-US" dirty="0"/>
+              <a:t>め</a:t>
+            </a:r>
+            <a:endParaRPr kumimoji="1" lang="ja-JP" altLang="en-US" dirty="0"/>
+          </a:p>
+        </p:txBody>
+      </p:sp>
+      <p:sp>
+        <p:nvSpPr>
+          <p:cNvPr id="3" name="コンテンツ プレースホルダー 2"/>
+          <p:cNvSpPr>
+            <a:spLocks noGrp="1"/>
+          </p:cNvSpPr>
+          <p:nvPr>
+            <p:ph idx="1"/>
+          </p:nvPr>
+        </p:nvSpPr>
+        <p:spPr/>
+        <p:txBody>
+          <a:bodyPr/>
+          <a:lstStyle/>
+          <a:p>
+            <a:r>
+              <a:rPr kumimoji="1" lang="ja-JP" altLang="en-US" dirty="0" smtClean="0"/>
+              <a:t>塗り絵を自動生成して自分だけの塗り絵を作ろう！</a:t>
+            </a:r>
+            <a:endParaRPr kumimoji="1" lang="en-US" altLang="ja-JP" dirty="0" smtClean="0"/>
+          </a:p>
+        </p:txBody>
+      </p:sp>
+      <p:sp>
+        <p:nvSpPr>
+          <p:cNvPr id="7" name="日付プレースホルダー 6"/>
+          <p:cNvSpPr>
+            <a:spLocks noGrp="1"/>
+          </p:cNvSpPr>
+          <p:nvPr>
+            <p:ph type="dt" sz="half" idx="10"/>
+          </p:nvPr>
+        </p:nvSpPr>
+        <p:spPr/>
+        <p:txBody>
+          <a:bodyPr/>
+          <a:lstStyle/>
+          <a:p>
+            <a:fld id="{B73BE00C-7ADA-4FCD-AAB2-CF527D6B0C23}" type="datetime1">
+              <a:rPr kumimoji="1" lang="ja-JP" altLang="en-US" smtClean="0"/>
+              <a:t>2017/7/5</a:t>
+            </a:fld>
+            <a:endParaRPr kumimoji="1" lang="ja-JP" altLang="en-US"/>
+          </a:p>
+        </p:txBody>
+      </p:sp>
+      <p:sp>
+        <p:nvSpPr>
+          <p:cNvPr id="8" name="フッター プレースホルダー 7"/>
+          <p:cNvSpPr>
+            <a:spLocks noGrp="1"/>
+          </p:cNvSpPr>
+          <p:nvPr>
+            <p:ph type="ftr" sz="quarter" idx="11"/>
+          </p:nvPr>
+        </p:nvSpPr>
+        <p:spPr/>
+        <p:txBody>
+          <a:bodyPr/>
+          <a:lstStyle/>
+          <a:p>
+            <a:endParaRPr kumimoji="1" lang="ja-JP" altLang="en-US"/>
+          </a:p>
+        </p:txBody>
+      </p:sp>
+      <p:sp>
+        <p:nvSpPr>
+          <p:cNvPr id="9" name="スライド番号プレースホルダー 8"/>
+          <p:cNvSpPr>
+            <a:spLocks noGrp="1"/>
+          </p:cNvSpPr>
+          <p:nvPr>
+            <p:ph type="sldNum" sz="quarter" idx="12"/>
+          </p:nvPr>
+        </p:nvSpPr>
+        <p:spPr/>
+        <p:txBody>
+          <a:bodyPr/>
+          <a:lstStyle/>
+          <a:p>
+            <a:fld id="{1833CB71-1218-46DA-97FE-FEE1D40BAC88}" type="slidenum">
+              <a:rPr kumimoji="1" lang="ja-JP" altLang="en-US" smtClean="0"/>
+              <a:t>14</a:t>
+            </a:fld>
+            <a:endParaRPr kumimoji="1" lang="ja-JP" altLang="en-US"/>
+          </a:p>
+        </p:txBody>
+      </p:sp>
+    </p:spTree>
+    <p:extLst>
+      <p:ext uri="{BB962C8B-B14F-4D97-AF65-F5344CB8AC3E}">
+        <p14:creationId xmlns:p14="http://schemas.microsoft.com/office/powerpoint/2010/main" val="2555963589"/>
+      </p:ext>
+    </p:extLst>
+  </p:cSld>
+  <p:clrMapOvr>
+    <a:masterClrMapping/>
+  </p:clrMapOvr>
+  <p:timing>
+    <p:tnLst>
+      <p:par>
+        <p:cTn id="1" dur="indefinite" restart="never" nodeType="tmRoot"/>
+      </p:par>
+    </p:tnLst>
+  </p:timing>
+</p:sld>
+</file>
+
+<file path=ppt/slides/slide15.xml><?xml version="1.0" encoding="utf-8"?>
+<p:sld xmlns:a="http://schemas.openxmlformats.org/drawingml/2006/main" xmlns:r="http://schemas.openxmlformats.org/officeDocument/2006/relationships" xmlns:p="http://schemas.openxmlformats.org/presentationml/2006/main">
+  <p:cSld>
+    <p:spTree>
+      <p:nvGrpSpPr>
+        <p:cNvPr id="1" name=""/>
+        <p:cNvGrpSpPr/>
+        <p:nvPr/>
+      </p:nvGrpSpPr>
+      <p:grpSpPr>
+        <a:xfrm>
+          <a:off x="0" y="0"/>
+          <a:ext cx="0" cy="0"/>
+          <a:chOff x="0" y="0"/>
+          <a:chExt cx="0" cy="0"/>
+        </a:xfrm>
+      </p:grpSpPr>
+      <p:sp>
+        <p:nvSpPr>
+          <p:cNvPr id="2" name="タイトル 1"/>
+          <p:cNvSpPr>
+            <a:spLocks noGrp="1"/>
+          </p:cNvSpPr>
+          <p:nvPr>
+            <p:ph type="ctrTitle"/>
+          </p:nvPr>
+        </p:nvSpPr>
+        <p:spPr/>
+        <p:txBody>
+          <a:bodyPr/>
+          <a:lstStyle/>
+          <a:p>
+            <a:r>
+              <a:rPr kumimoji="1" lang="ja-JP" altLang="en-US" dirty="0" smtClean="0"/>
+              <a:t>補遺</a:t>
+            </a:r>
+            <a:endParaRPr kumimoji="1" lang="ja-JP" altLang="en-US" dirty="0"/>
+          </a:p>
+        </p:txBody>
+      </p:sp>
+      <p:sp>
+        <p:nvSpPr>
+          <p:cNvPr id="3" name="日付プレースホルダー 2"/>
+          <p:cNvSpPr>
+            <a:spLocks noGrp="1"/>
+          </p:cNvSpPr>
+          <p:nvPr>
+            <p:ph type="dt" sz="half" idx="10"/>
+          </p:nvPr>
+        </p:nvSpPr>
+        <p:spPr/>
+        <p:txBody>
+          <a:bodyPr/>
+          <a:lstStyle/>
+          <a:p>
+            <a:fld id="{BDADFCCA-FEA0-49F1-9EBA-64E79067CB58}" type="datetime1">
+              <a:rPr kumimoji="1" lang="ja-JP" altLang="en-US" smtClean="0"/>
+              <a:t>2017/7/5</a:t>
+            </a:fld>
+            <a:endParaRPr kumimoji="1" lang="ja-JP" altLang="en-US"/>
+          </a:p>
+        </p:txBody>
+      </p:sp>
+      <p:sp>
+        <p:nvSpPr>
+          <p:cNvPr id="4" name="フッター プレースホルダー 3"/>
+          <p:cNvSpPr>
+            <a:spLocks noGrp="1"/>
+          </p:cNvSpPr>
+          <p:nvPr>
+            <p:ph type="ftr" sz="quarter" idx="11"/>
+          </p:nvPr>
+        </p:nvSpPr>
+        <p:spPr/>
+        <p:txBody>
+          <a:bodyPr/>
+          <a:lstStyle/>
+          <a:p>
+            <a:endParaRPr kumimoji="1" lang="ja-JP" altLang="en-US"/>
+          </a:p>
+        </p:txBody>
+      </p:sp>
+      <p:sp>
+        <p:nvSpPr>
+          <p:cNvPr id="5" name="スライド番号プレースホルダー 4"/>
+          <p:cNvSpPr>
+            <a:spLocks noGrp="1"/>
+          </p:cNvSpPr>
+          <p:nvPr>
+            <p:ph type="sldNum" sz="quarter" idx="12"/>
+          </p:nvPr>
+        </p:nvSpPr>
+        <p:spPr/>
+        <p:txBody>
+          <a:bodyPr/>
+          <a:lstStyle/>
+          <a:p>
+            <a:fld id="{1833CB71-1218-46DA-97FE-FEE1D40BAC88}" type="slidenum">
+              <a:rPr kumimoji="1" lang="ja-JP" altLang="en-US" smtClean="0"/>
+              <a:t>15</a:t>
+            </a:fld>
+            <a:endParaRPr kumimoji="1" lang="ja-JP" altLang="en-US"/>
+          </a:p>
+        </p:txBody>
+      </p:sp>
+      <p:sp>
+        <p:nvSpPr>
+          <p:cNvPr id="6" name="テキスト プレースホルダー 5"/>
+          <p:cNvSpPr>
+            <a:spLocks noGrp="1"/>
+          </p:cNvSpPr>
+          <p:nvPr>
+            <p:ph type="body" sz="quarter" idx="13"/>
+          </p:nvPr>
+        </p:nvSpPr>
+        <p:spPr/>
+        <p:txBody>
+          <a:bodyPr/>
+          <a:lstStyle/>
+          <a:p>
+            <a:endParaRPr kumimoji="1" lang="ja-JP" altLang="en-US"/>
+          </a:p>
+        </p:txBody>
+      </p:sp>
+    </p:spTree>
+    <p:extLst>
+      <p:ext uri="{BB962C8B-B14F-4D97-AF65-F5344CB8AC3E}">
+        <p14:creationId xmlns:p14="http://schemas.microsoft.com/office/powerpoint/2010/main" val="1020548274"/>
+      </p:ext>
+    </p:extLst>
+  </p:cSld>
+  <p:clrMapOvr>
+    <a:masterClrMapping/>
+  </p:clrMapOvr>
+  <mc:AlternateContent xmlns:mc="http://schemas.openxmlformats.org/markup-compatibility/2006" xmlns:p14="http://schemas.microsoft.com/office/powerpoint/2010/main">
+    <mc:Choice Requires="p14">
+      <p:transition spd="slow" p14:dur="2000"/>
+    </mc:Choice>
+    <mc:Fallback xmlns="">
+      <p:transition spd="slow"/>
+    </mc:Fallback>
+  </mc:AlternateContent>
+  <p:timing>
+    <p:tnLst>
+      <p:par>
+        <p:cTn id="1" dur="indefinite" restart="never" nodeType="tmRoot"/>
+      </p:par>
+    </p:tnLst>
+  </p:timing>
+</p:sld>
+</file>
+
+<file path=ppt/slides/slide16.xml><?xml version="1.0" encoding="utf-8"?>
+<p:sld xmlns:a="http://schemas.openxmlformats.org/drawingml/2006/main" xmlns:r="http://schemas.openxmlformats.org/officeDocument/2006/relationships" xmlns:p="http://schemas.openxmlformats.org/presentationml/2006/main">
+  <p:cSld>
+    <p:spTree>
+      <p:nvGrpSpPr>
+        <p:cNvPr id="1" name=""/>
+        <p:cNvGrpSpPr/>
+        <p:nvPr/>
+      </p:nvGrpSpPr>
+      <p:grpSpPr>
+        <a:xfrm>
+          <a:off x="0" y="0"/>
+          <a:ext cx="0" cy="0"/>
+          <a:chOff x="0" y="0"/>
+          <a:chExt cx="0" cy="0"/>
+        </a:xfrm>
+      </p:grpSpPr>
+      <p:sp>
+        <p:nvSpPr>
+          <p:cNvPr id="2" name="タイトル 1"/>
+          <p:cNvSpPr>
+            <a:spLocks noGrp="1"/>
+          </p:cNvSpPr>
+          <p:nvPr>
+            <p:ph type="title"/>
+          </p:nvPr>
+        </p:nvSpPr>
+        <p:spPr/>
+        <p:txBody>
+          <a:bodyPr/>
+          <a:lstStyle/>
+          <a:p>
+            <a:r>
+              <a:rPr kumimoji="1" lang="ja-JP" altLang="en-US" dirty="0" smtClean="0"/>
+              <a:t>採点機能</a:t>
+            </a:r>
+            <a:endParaRPr kumimoji="1" lang="ja-JP" altLang="en-US" dirty="0"/>
+          </a:p>
+        </p:txBody>
+      </p:sp>
+      <p:sp>
+        <p:nvSpPr>
+          <p:cNvPr id="3" name="コンテンツ プレースホルダー 2"/>
+          <p:cNvSpPr>
+            <a:spLocks noGrp="1"/>
+          </p:cNvSpPr>
+          <p:nvPr>
+            <p:ph idx="1"/>
+          </p:nvPr>
+        </p:nvSpPr>
+        <p:spPr/>
+        <p:txBody>
+          <a:bodyPr>
+            <a:normAutofit/>
+          </a:bodyPr>
+          <a:lstStyle/>
+          <a:p>
+            <a:r>
+              <a:rPr kumimoji="1" lang="ja-JP" altLang="en-US" dirty="0" smtClean="0"/>
+              <a:t>採点機能を付けました</a:t>
+            </a:r>
+            <a:endParaRPr lang="en-US" altLang="ja-JP" dirty="0" smtClean="0"/>
+          </a:p>
+          <a:p>
+            <a:pPr lvl="1"/>
+            <a:r>
+              <a:rPr kumimoji="1" lang="ja-JP" altLang="en-US" dirty="0" smtClean="0"/>
+              <a:t>塗り絵の白黒画像を生成する際に「答え」となる元画像が存在する</a:t>
+            </a:r>
+            <a:r>
+              <a:rPr lang="en-US" altLang="ja-JP" dirty="0"/>
+              <a:t/>
+            </a:r>
+            <a:br>
+              <a:rPr lang="en-US" altLang="ja-JP" dirty="0"/>
+            </a:br>
+            <a:r>
+              <a:rPr kumimoji="1" lang="ja-JP" altLang="en-US" dirty="0" smtClean="0"/>
+              <a:t>→　塗り絵と元画像の色の距離をスコアにすれば採点ができるのでは？</a:t>
+            </a:r>
+            <a:endParaRPr kumimoji="1" lang="en-US" altLang="ja-JP" dirty="0" smtClean="0"/>
+          </a:p>
+          <a:p>
+            <a:pPr lvl="1"/>
+            <a:endParaRPr lang="en-US" altLang="ja-JP" dirty="0"/>
+          </a:p>
+          <a:p>
+            <a:r>
+              <a:rPr lang="ja-JP" altLang="en-US" dirty="0"/>
+              <a:t>課題</a:t>
+            </a:r>
+            <a:endParaRPr kumimoji="1" lang="en-US" altLang="ja-JP" dirty="0" smtClean="0"/>
+          </a:p>
+          <a:p>
+            <a:pPr lvl="1"/>
+            <a:r>
+              <a:rPr kumimoji="1" lang="en-US" altLang="ja-JP" dirty="0" smtClean="0"/>
+              <a:t>RGB</a:t>
+            </a:r>
+            <a:r>
+              <a:rPr lang="ja-JP" altLang="en-US" dirty="0" smtClean="0"/>
+              <a:t>だとう</a:t>
+            </a:r>
+            <a:r>
+              <a:rPr lang="ja-JP" altLang="en-US" dirty="0" err="1" smtClean="0"/>
+              <a:t>まくいかないので</a:t>
+            </a:r>
+            <a:r>
+              <a:rPr lang="en-US" altLang="ja-JP" dirty="0" smtClean="0"/>
+              <a:t>HSV</a:t>
+            </a:r>
+            <a:r>
+              <a:rPr lang="ja-JP" altLang="en-US" dirty="0" smtClean="0"/>
+              <a:t>で試したが正確な評価は難しい</a:t>
+            </a:r>
+            <a:endParaRPr lang="en-US" altLang="ja-JP" dirty="0" smtClean="0"/>
+          </a:p>
+          <a:p>
+            <a:pPr lvl="1"/>
+            <a:r>
+              <a:rPr lang="ja-JP" altLang="en-US" dirty="0" smtClean="0"/>
+              <a:t>答えとなる画像は色が一様でない</a:t>
+            </a:r>
+            <a:endParaRPr lang="en-US" altLang="ja-JP" dirty="0" smtClean="0"/>
+          </a:p>
+          <a:p>
+            <a:pPr lvl="1"/>
+            <a:r>
+              <a:rPr lang="ja-JP" altLang="en-US" dirty="0" smtClean="0"/>
+              <a:t>クラスタ化後の画像は色が制限されているので答えとしては不適当</a:t>
+            </a:r>
+            <a:r>
+              <a:rPr lang="ja-JP" altLang="en-US" dirty="0"/>
+              <a:t>？</a:t>
+            </a:r>
+            <a:endParaRPr lang="en-US" altLang="ja-JP" dirty="0" smtClean="0"/>
+          </a:p>
+          <a:p>
+            <a:endParaRPr kumimoji="1" lang="ja-JP" altLang="en-US" dirty="0"/>
+          </a:p>
+        </p:txBody>
+      </p:sp>
+      <p:sp>
+        <p:nvSpPr>
+          <p:cNvPr id="4" name="日付プレースホルダー 3"/>
+          <p:cNvSpPr>
+            <a:spLocks noGrp="1"/>
+          </p:cNvSpPr>
+          <p:nvPr>
+            <p:ph type="dt" sz="half" idx="10"/>
+          </p:nvPr>
+        </p:nvSpPr>
+        <p:spPr/>
+        <p:txBody>
+          <a:bodyPr/>
+          <a:lstStyle/>
+          <a:p>
+            <a:fld id="{67DC942D-6C63-4B5F-9446-D7E9D4D87299}" type="datetime1">
+              <a:rPr kumimoji="1" lang="ja-JP" altLang="en-US" smtClean="0"/>
+              <a:t>2017/7/5</a:t>
+            </a:fld>
+            <a:endParaRPr kumimoji="1" lang="ja-JP" altLang="en-US"/>
+          </a:p>
+        </p:txBody>
+      </p:sp>
+      <p:sp>
+        <p:nvSpPr>
+          <p:cNvPr id="5" name="フッター プレースホルダー 4"/>
+          <p:cNvSpPr>
+            <a:spLocks noGrp="1"/>
+          </p:cNvSpPr>
+          <p:nvPr>
+            <p:ph type="ftr" sz="quarter" idx="11"/>
+          </p:nvPr>
+        </p:nvSpPr>
+        <p:spPr/>
+        <p:txBody>
+          <a:bodyPr/>
+          <a:lstStyle/>
+          <a:p>
+            <a:endParaRPr kumimoji="1" lang="ja-JP" altLang="en-US"/>
+          </a:p>
+        </p:txBody>
+      </p:sp>
+      <p:sp>
+        <p:nvSpPr>
+          <p:cNvPr id="6" name="スライド番号プレースホルダー 5"/>
+          <p:cNvSpPr>
+            <a:spLocks noGrp="1"/>
+          </p:cNvSpPr>
+          <p:nvPr>
+            <p:ph type="sldNum" sz="quarter" idx="12"/>
+          </p:nvPr>
+        </p:nvSpPr>
+        <p:spPr/>
+        <p:txBody>
+          <a:bodyPr/>
+          <a:lstStyle/>
+          <a:p>
+            <a:fld id="{1833CB71-1218-46DA-97FE-FEE1D40BAC88}" type="slidenum">
+              <a:rPr kumimoji="1" lang="ja-JP" altLang="en-US" smtClean="0"/>
+              <a:t>16</a:t>
+            </a:fld>
+            <a:endParaRPr kumimoji="1" lang="ja-JP" altLang="en-US"/>
+          </a:p>
+        </p:txBody>
+      </p:sp>
+    </p:spTree>
+    <p:extLst>
+      <p:ext uri="{BB962C8B-B14F-4D97-AF65-F5344CB8AC3E}">
+        <p14:creationId xmlns:p14="http://schemas.microsoft.com/office/powerpoint/2010/main" val="4226712121"/>
+      </p:ext>
+    </p:extLst>
+  </p:cSld>
+  <p:clrMapOvr>
+    <a:masterClrMapping/>
+  </p:clrMapOvr>
+  <mc:AlternateContent xmlns:mc="http://schemas.openxmlformats.org/markup-compatibility/2006" xmlns:p14="http://schemas.microsoft.com/office/powerpoint/2010/main">
+    <mc:Choice Requires="p14">
+      <p:transition spd="slow" p14:dur="2000"/>
+    </mc:Choice>
+    <mc:Fallback xmlns="">
+      <p:transition spd="slow"/>
+    </mc:Fallback>
+  </mc:AlternateContent>
+  <p:timing>
+    <p:tnLst>
+      <p:par>
+        <p:cTn id="1" dur="indefinite" restart="never" nodeType="tmRoot"/>
+      </p:par>
+    </p:tnLst>
+  </p:timing>
+</p:sld>
+</file>
+
+<file path=ppt/slides/slide17.xml><?xml version="1.0" encoding="utf-8"?>
+<p:sld xmlns:a="http://schemas.openxmlformats.org/drawingml/2006/main" xmlns:r="http://schemas.openxmlformats.org/officeDocument/2006/relationships" xmlns:p="http://schemas.openxmlformats.org/presentationml/2006/main" show="0">
+  <p:cSld>
+    <p:spTree>
+      <p:nvGrpSpPr>
+        <p:cNvPr id="1" name=""/>
+        <p:cNvGrpSpPr/>
+        <p:nvPr/>
+      </p:nvGrpSpPr>
+      <p:grpSpPr>
+        <a:xfrm>
+          <a:off x="0" y="0"/>
+          <a:ext cx="0" cy="0"/>
+          <a:chOff x="0" y="0"/>
+          <a:chExt cx="0" cy="0"/>
+        </a:xfrm>
+      </p:grpSpPr>
+      <p:sp>
+        <p:nvSpPr>
+          <p:cNvPr id="2" name="タイトル 1"/>
+          <p:cNvSpPr>
+            <a:spLocks noGrp="1"/>
+          </p:cNvSpPr>
+          <p:nvPr>
+            <p:ph type="title"/>
+          </p:nvPr>
+        </p:nvSpPr>
+        <p:spPr/>
+        <p:txBody>
+          <a:bodyPr/>
+          <a:lstStyle/>
+          <a:p>
+            <a:endParaRPr kumimoji="1" lang="ja-JP" altLang="en-US"/>
+          </a:p>
+        </p:txBody>
+      </p:sp>
+      <p:sp>
+        <p:nvSpPr>
+          <p:cNvPr id="3" name="コンテンツ プレースホルダー 2"/>
+          <p:cNvSpPr>
+            <a:spLocks noGrp="1"/>
+          </p:cNvSpPr>
+          <p:nvPr>
+            <p:ph idx="1"/>
+          </p:nvPr>
+        </p:nvSpPr>
+        <p:spPr/>
+        <p:txBody>
+          <a:bodyPr/>
+          <a:lstStyle/>
+          <a:p>
+            <a:endParaRPr kumimoji="1" lang="ja-JP" altLang="en-US"/>
+          </a:p>
+        </p:txBody>
+      </p:sp>
+      <p:sp>
+        <p:nvSpPr>
+          <p:cNvPr id="7" name="日付プレースホルダー 6"/>
+          <p:cNvSpPr>
+            <a:spLocks noGrp="1"/>
+          </p:cNvSpPr>
+          <p:nvPr>
+            <p:ph type="dt" sz="half" idx="10"/>
+          </p:nvPr>
+        </p:nvSpPr>
+        <p:spPr/>
+        <p:txBody>
+          <a:bodyPr/>
+          <a:lstStyle/>
+          <a:p>
+            <a:fld id="{DEEDFEEB-AB76-423B-8BC1-2B3CDB8447F6}" type="datetime1">
+              <a:rPr kumimoji="1" lang="ja-JP" altLang="en-US" smtClean="0"/>
+              <a:t>2017/7/5</a:t>
+            </a:fld>
+            <a:endParaRPr kumimoji="1" lang="ja-JP" altLang="en-US"/>
+          </a:p>
+        </p:txBody>
+      </p:sp>
+      <p:sp>
+        <p:nvSpPr>
+          <p:cNvPr id="8" name="フッター プレースホルダー 7"/>
+          <p:cNvSpPr>
+            <a:spLocks noGrp="1"/>
+          </p:cNvSpPr>
+          <p:nvPr>
+            <p:ph type="ftr" sz="quarter" idx="11"/>
+          </p:nvPr>
+        </p:nvSpPr>
+        <p:spPr/>
+        <p:txBody>
+          <a:bodyPr/>
+          <a:lstStyle/>
+          <a:p>
+            <a:endParaRPr kumimoji="1" lang="ja-JP" altLang="en-US"/>
+          </a:p>
+        </p:txBody>
+      </p:sp>
+      <p:sp>
+        <p:nvSpPr>
+          <p:cNvPr id="9" name="スライド番号プレースホルダー 8"/>
+          <p:cNvSpPr>
+            <a:spLocks noGrp="1"/>
+          </p:cNvSpPr>
+          <p:nvPr>
+            <p:ph type="sldNum" sz="quarter" idx="12"/>
+          </p:nvPr>
+        </p:nvSpPr>
+        <p:spPr/>
+        <p:txBody>
+          <a:bodyPr/>
+          <a:lstStyle/>
+          <a:p>
+            <a:fld id="{1833CB71-1218-46DA-97FE-FEE1D40BAC88}" type="slidenum">
+              <a:rPr kumimoji="1" lang="ja-JP" altLang="en-US" smtClean="0"/>
+              <a:t>17</a:t>
+            </a:fld>
+            <a:endParaRPr kumimoji="1" lang="ja-JP" altLang="en-US"/>
+          </a:p>
+        </p:txBody>
+      </p:sp>
+      <p:sp>
+        <p:nvSpPr>
+          <p:cNvPr id="4" name="四角形吹き出し 3"/>
+          <p:cNvSpPr/>
+          <p:nvPr/>
+        </p:nvSpPr>
+        <p:spPr>
+          <a:xfrm>
+            <a:off x="1432613" y="5314247"/>
+            <a:ext cx="1680796" cy="715109"/>
+          </a:xfrm>
+          <a:prstGeom prst="wedgeRectCallout">
+            <a:avLst>
+              <a:gd name="adj1" fmla="val -71790"/>
+              <a:gd name="adj2" fmla="val 49761"/>
+            </a:avLst>
+          </a:prstGeom>
+          <a:ln w="19050">
+            <a:solidFill>
+              <a:schemeClr val="accent2">
+                <a:lumMod val="75000"/>
+              </a:schemeClr>
+            </a:solidFill>
+          </a:ln>
+        </p:spPr>
+        <p:style>
+          <a:lnRef idx="2">
+            <a:schemeClr val="accent2"/>
+          </a:lnRef>
+          <a:fillRef idx="1">
+            <a:schemeClr val="lt1"/>
+          </a:fillRef>
+          <a:effectRef idx="0">
+            <a:schemeClr val="accent2"/>
+          </a:effectRef>
+          <a:fontRef idx="minor">
+            <a:schemeClr val="dk1"/>
+          </a:fontRef>
+        </p:style>
+        <p:txBody>
+          <a:bodyPr rtlCol="0" anchor="ctr"/>
+          <a:lstStyle/>
+          <a:p>
+            <a:pPr algn="ctr"/>
+            <a:r>
+              <a:rPr kumimoji="1" lang="ja-JP" altLang="en-US" dirty="0" smtClean="0">
+                <a:latin typeface="+mn-ea"/>
+              </a:rPr>
+              <a:t>吹き出し</a:t>
+            </a:r>
+            <a:endParaRPr kumimoji="1" lang="en-US" altLang="ja-JP" dirty="0" smtClean="0">
+              <a:latin typeface="+mn-ea"/>
+            </a:endParaRPr>
+          </a:p>
+          <a:p>
+            <a:pPr algn="ctr"/>
+            <a:r>
+              <a:rPr kumimoji="1" lang="ja-JP" altLang="en-US" b="1" dirty="0" smtClean="0">
+                <a:solidFill>
+                  <a:srgbClr val="FF0000"/>
+                </a:solidFill>
+                <a:latin typeface="+mn-ea"/>
+              </a:rPr>
+              <a:t>注意</a:t>
+            </a:r>
+            <a:r>
+              <a:rPr kumimoji="1" lang="ja-JP" altLang="en-US" dirty="0">
+                <a:latin typeface="+mn-ea"/>
+              </a:rPr>
+              <a:t>事項</a:t>
+            </a:r>
+          </a:p>
+        </p:txBody>
+      </p:sp>
+      <p:sp>
+        <p:nvSpPr>
+          <p:cNvPr id="10" name="四角形吹き出し 9"/>
+          <p:cNvSpPr/>
+          <p:nvPr/>
+        </p:nvSpPr>
+        <p:spPr>
+          <a:xfrm>
+            <a:off x="3731602" y="5325972"/>
+            <a:ext cx="1680796" cy="715109"/>
+          </a:xfrm>
+          <a:prstGeom prst="wedgeRectCallout">
+            <a:avLst>
+              <a:gd name="adj1" fmla="val -71790"/>
+              <a:gd name="adj2" fmla="val 49761"/>
+            </a:avLst>
+          </a:prstGeom>
+        </p:spPr>
+        <p:style>
+          <a:lnRef idx="2">
+            <a:schemeClr val="accent6"/>
+          </a:lnRef>
+          <a:fillRef idx="1">
+            <a:schemeClr val="lt1"/>
+          </a:fillRef>
+          <a:effectRef idx="0">
+            <a:schemeClr val="accent6"/>
+          </a:effectRef>
+          <a:fontRef idx="minor">
+            <a:schemeClr val="dk1"/>
+          </a:fontRef>
+        </p:style>
+        <p:txBody>
+          <a:bodyPr rtlCol="0" anchor="ctr"/>
+          <a:lstStyle/>
+          <a:p>
+            <a:pPr algn="ctr"/>
+            <a:r>
+              <a:rPr kumimoji="1" lang="ja-JP" altLang="en-US" dirty="0" smtClean="0">
+                <a:latin typeface="+mn-ea"/>
+              </a:rPr>
+              <a:t>吹き出し</a:t>
+            </a:r>
+            <a:endParaRPr kumimoji="1" lang="en-US" altLang="ja-JP" dirty="0" smtClean="0">
+              <a:latin typeface="+mn-ea"/>
+            </a:endParaRPr>
+          </a:p>
+          <a:p>
+            <a:pPr algn="ctr"/>
+            <a:r>
+              <a:rPr kumimoji="1" lang="ja-JP" altLang="en-US" dirty="0" smtClean="0">
+                <a:latin typeface="+mn-ea"/>
+              </a:rPr>
+              <a:t>所感など</a:t>
+            </a:r>
+            <a:endParaRPr kumimoji="1" lang="ja-JP" altLang="en-US" dirty="0">
+              <a:latin typeface="+mn-ea"/>
+            </a:endParaRPr>
+          </a:p>
+        </p:txBody>
+      </p:sp>
+      <p:sp>
+        <p:nvSpPr>
+          <p:cNvPr id="11" name="四角形吹き出し 10"/>
+          <p:cNvSpPr/>
+          <p:nvPr/>
+        </p:nvSpPr>
+        <p:spPr>
+          <a:xfrm>
+            <a:off x="6030591" y="5325972"/>
+            <a:ext cx="1680796" cy="715109"/>
+          </a:xfrm>
+          <a:prstGeom prst="wedgeRectCallout">
+            <a:avLst>
+              <a:gd name="adj1" fmla="val -71790"/>
+              <a:gd name="adj2" fmla="val 49761"/>
+            </a:avLst>
+          </a:prstGeom>
+          <a:ln>
+            <a:solidFill>
+              <a:schemeClr val="accent4">
+                <a:lumMod val="75000"/>
+              </a:schemeClr>
+            </a:solidFill>
+          </a:ln>
+        </p:spPr>
+        <p:style>
+          <a:lnRef idx="2">
+            <a:schemeClr val="accent4"/>
+          </a:lnRef>
+          <a:fillRef idx="1">
+            <a:schemeClr val="lt1"/>
+          </a:fillRef>
+          <a:effectRef idx="0">
+            <a:schemeClr val="accent4"/>
+          </a:effectRef>
+          <a:fontRef idx="minor">
+            <a:schemeClr val="dk1"/>
+          </a:fontRef>
+        </p:style>
+        <p:txBody>
+          <a:bodyPr rtlCol="0" anchor="ctr"/>
+          <a:lstStyle/>
+          <a:p>
+            <a:pPr algn="ctr"/>
+            <a:r>
+              <a:rPr kumimoji="1" lang="ja-JP" altLang="en-US" dirty="0" smtClean="0">
+                <a:latin typeface="+mn-ea"/>
+              </a:rPr>
+              <a:t>吹き出し</a:t>
+            </a:r>
+            <a:endParaRPr kumimoji="1" lang="en-US" altLang="ja-JP" dirty="0" smtClean="0">
+              <a:latin typeface="+mn-ea"/>
+            </a:endParaRPr>
+          </a:p>
+          <a:p>
+            <a:pPr algn="ctr"/>
+            <a:r>
+              <a:rPr kumimoji="1" lang="ja-JP" altLang="en-US" dirty="0" smtClean="0">
+                <a:latin typeface="+mn-ea"/>
+              </a:rPr>
+              <a:t>その</a:t>
+            </a:r>
+            <a:r>
+              <a:rPr kumimoji="1" lang="ja-JP" altLang="en-US" dirty="0">
+                <a:latin typeface="+mn-ea"/>
+              </a:rPr>
+              <a:t>他</a:t>
+            </a:r>
+          </a:p>
+        </p:txBody>
+      </p:sp>
+      <p:sp>
+        <p:nvSpPr>
+          <p:cNvPr id="12" name="四角形吹き出し 11"/>
+          <p:cNvSpPr/>
+          <p:nvPr/>
+        </p:nvSpPr>
+        <p:spPr>
+          <a:xfrm>
+            <a:off x="1432612" y="4321212"/>
+            <a:ext cx="3979785" cy="715109"/>
+          </a:xfrm>
+          <a:prstGeom prst="wedgeRectCallout">
+            <a:avLst>
+              <a:gd name="adj1" fmla="val -71790"/>
+              <a:gd name="adj2" fmla="val 49761"/>
+            </a:avLst>
+          </a:prstGeom>
+          <a:solidFill>
+            <a:schemeClr val="accent1">
+              <a:lumMod val="75000"/>
+            </a:schemeClr>
+          </a:solidFill>
+          <a:ln>
+            <a:noFill/>
+          </a:ln>
+        </p:spPr>
+        <p:style>
+          <a:lnRef idx="2">
+            <a:schemeClr val="accent1">
+              <a:shade val="50000"/>
+            </a:schemeClr>
+          </a:lnRef>
+          <a:fillRef idx="1">
+            <a:schemeClr val="accent1"/>
+          </a:fillRef>
+          <a:effectRef idx="0">
+            <a:schemeClr val="accent1"/>
+          </a:effectRef>
+          <a:fontRef idx="minor">
+            <a:schemeClr val="lt1"/>
+          </a:fontRef>
+        </p:style>
+        <p:txBody>
+          <a:bodyPr rtlCol="0" anchor="t"/>
+          <a:lstStyle/>
+          <a:p>
+            <a:pPr algn="just"/>
+            <a:r>
+              <a:rPr kumimoji="1" lang="ja-JP" altLang="en-US" dirty="0" smtClean="0">
+                <a:latin typeface="+mn-ea"/>
+              </a:rPr>
+              <a:t>比較的大きな吹き出し</a:t>
+            </a:r>
+            <a:endParaRPr kumimoji="1" lang="ja-JP" altLang="en-US" dirty="0">
+              <a:latin typeface="+mn-ea"/>
+            </a:endParaRPr>
+          </a:p>
+        </p:txBody>
+      </p:sp>
+    </p:spTree>
+    <p:extLst>
+      <p:ext uri="{BB962C8B-B14F-4D97-AF65-F5344CB8AC3E}">
+        <p14:creationId xmlns:p14="http://schemas.microsoft.com/office/powerpoint/2010/main" val="3602633670"/>
+      </p:ext>
+    </p:extLst>
+  </p:cSld>
+  <p:clrMapOvr>
+    <a:masterClrMapping/>
+  </p:clrMapOvr>
+  <mc:AlternateContent xmlns:mc="http://schemas.openxmlformats.org/markup-compatibility/2006" xmlns:p14="http://schemas.microsoft.com/office/powerpoint/2010/main">
+    <mc:Choice Requires="p14">
+      <p:transition spd="slow" p14:dur="2000"/>
+    </mc:Choice>
+    <mc:Fallback xmlns="">
+      <p:transition spd="slow"/>
+    </mc:Fallback>
+  </mc:AlternateContent>
   <p:timing>
     <p:tnLst>
       <p:par>
@@ -5066,6 +6827,10 @@
           <a:bodyPr/>
           <a:lstStyle/>
           <a:p>
+            <a:r>
+              <a:rPr kumimoji="1" lang="ja-JP" altLang="en-US" dirty="0" smtClean="0"/>
+              <a:t>概要</a:t>
+            </a:r>
             <a:endParaRPr kumimoji="1" lang="ja-JP" altLang="en-US" dirty="0"/>
           </a:p>
         </p:txBody>
@@ -5085,6 +6850,76 @@
           <a:bodyPr/>
           <a:lstStyle/>
           <a:p>
+            <a:r>
+              <a:rPr lang="ja-JP" altLang="en-US" dirty="0" smtClean="0"/>
+              <a:t>提案アプリケーション：</a:t>
+            </a:r>
+            <a:r>
+              <a:rPr lang="en-US" altLang="ja-JP" dirty="0" smtClean="0"/>
+              <a:t/>
+            </a:r>
+            <a:br>
+              <a:rPr lang="en-US" altLang="ja-JP" dirty="0" smtClean="0"/>
+            </a:br>
+            <a:r>
+              <a:rPr kumimoji="1" lang="ja-JP" altLang="en-US" dirty="0" smtClean="0"/>
+              <a:t>写真を適切な領域に分割し，</a:t>
+            </a:r>
+            <a:r>
+              <a:rPr kumimoji="1" lang="en-US" altLang="ja-JP" dirty="0" smtClean="0"/>
+              <a:t/>
+            </a:r>
+            <a:br>
+              <a:rPr kumimoji="1" lang="en-US" altLang="ja-JP" dirty="0" smtClean="0"/>
+            </a:br>
+            <a:r>
+              <a:rPr kumimoji="1" lang="ja-JP" altLang="en-US" dirty="0" smtClean="0"/>
+              <a:t>自動で塗り絵の問題を作成するアプリ</a:t>
+            </a:r>
+            <a:endParaRPr kumimoji="1" lang="en-US" altLang="ja-JP" dirty="0" smtClean="0"/>
+          </a:p>
+          <a:p>
+            <a:pPr lvl="1"/>
+            <a:r>
+              <a:rPr lang="ja-JP" altLang="en-US" dirty="0" smtClean="0"/>
+              <a:t>解答画像の作成：原</a:t>
+            </a:r>
+            <a:r>
+              <a:rPr lang="ja-JP" altLang="en-US" dirty="0"/>
+              <a:t>画像</a:t>
+            </a:r>
+            <a:r>
+              <a:rPr lang="ja-JP" altLang="en-US" dirty="0" smtClean="0"/>
+              <a:t>をクラスタリング</a:t>
+            </a:r>
+            <a:endParaRPr lang="en-US" altLang="ja-JP" dirty="0" smtClean="0"/>
+          </a:p>
+          <a:p>
+            <a:pPr lvl="2"/>
+            <a:r>
+              <a:rPr lang="ja-JP" altLang="en-US" dirty="0" smtClean="0"/>
+              <a:t>位置情報・色情報を活用</a:t>
+            </a:r>
+            <a:endParaRPr lang="en-US" altLang="ja-JP" dirty="0" smtClean="0"/>
+          </a:p>
+          <a:p>
+            <a:pPr lvl="2"/>
+            <a:r>
+              <a:rPr lang="ja-JP" altLang="en-US" dirty="0" smtClean="0"/>
+              <a:t>色数を制限</a:t>
+            </a:r>
+            <a:endParaRPr lang="en-US" altLang="ja-JP" dirty="0"/>
+          </a:p>
+          <a:p>
+            <a:pPr lvl="1"/>
+            <a:r>
+              <a:rPr lang="ja-JP" altLang="en-US" dirty="0" smtClean="0"/>
+              <a:t>問題画像の作成：解答画像の境界の取得</a:t>
+            </a:r>
+            <a:endParaRPr lang="en-US" altLang="ja-JP" dirty="0" smtClean="0"/>
+          </a:p>
+          <a:p>
+            <a:pPr lvl="1"/>
             <a:endParaRPr kumimoji="1" lang="ja-JP" altLang="en-US" dirty="0"/>
           </a:p>
         </p:txBody>
@@ -5106,7 +6941,7 @@
           <a:p>
             <a:fld id="{52D45674-CF83-4B46-A72C-F79484250A68}" type="datetime1">
               <a:rPr kumimoji="1" lang="ja-JP" altLang="en-US" smtClean="0"/>
-              <a:t>2017/7/1</a:t>
+              <a:t>2017/7/5</a:t>
             </a:fld>
             <a:endParaRPr kumimoji="1" lang="ja-JP" altLang="en-US"/>
           </a:p>
@@ -5150,6 +6985,106 @@
               <a:rPr kumimoji="1" lang="ja-JP" altLang="en-US" smtClean="0"/>
               <a:t>2</a:t>
             </a:fld>
+            <a:endParaRPr kumimoji="1" lang="ja-JP" altLang="en-US"/>
+          </a:p>
+        </p:txBody>
+      </p:sp>
+      <p:pic>
+        <p:nvPicPr>
+          <p:cNvPr id="5" name="図 4"/>
+          <p:cNvPicPr>
+            <a:picLocks noChangeAspect="1"/>
+          </p:cNvPicPr>
+          <p:nvPr/>
+        </p:nvPicPr>
+        <p:blipFill>
+          <a:blip r:embed="rId2" cstate="print">
+            <a:extLst>
+              <a:ext uri="{28A0092B-C50C-407E-A947-70E740481C1C}">
+                <a14:useLocalDpi xmlns:a14="http://schemas.microsoft.com/office/drawing/2010/main" val="0"/>
+              </a:ext>
+            </a:extLst>
+          </a:blip>
+          <a:stretch>
+            <a:fillRect/>
+          </a:stretch>
+        </p:blipFill>
+        <p:spPr>
+          <a:xfrm>
+            <a:off x="6960313" y="4131104"/>
+            <a:ext cx="1906507" cy="2176177"/>
+          </a:xfrm>
+          <a:prstGeom prst="rect">
+            <a:avLst/>
+          </a:prstGeom>
+        </p:spPr>
+      </p:pic>
+      <p:pic>
+        <p:nvPicPr>
+          <p:cNvPr id="10" name="図 9"/>
+          <p:cNvPicPr>
+            <a:picLocks noChangeAspect="1"/>
+          </p:cNvPicPr>
+          <p:nvPr/>
+        </p:nvPicPr>
+        <p:blipFill>
+          <a:blip r:embed="rId3" cstate="print">
+            <a:extLst>
+              <a:ext uri="{28A0092B-C50C-407E-A947-70E740481C1C}">
+                <a14:useLocalDpi xmlns:a14="http://schemas.microsoft.com/office/drawing/2010/main" val="0"/>
+              </a:ext>
+            </a:extLst>
+          </a:blip>
+          <a:stretch>
+            <a:fillRect/>
+          </a:stretch>
+        </p:blipFill>
+        <p:spPr>
+          <a:xfrm>
+            <a:off x="3224631" y="4319191"/>
+            <a:ext cx="2694737" cy="1800000"/>
+          </a:xfrm>
+          <a:prstGeom prst="rect">
+            <a:avLst/>
+          </a:prstGeom>
+        </p:spPr>
+      </p:pic>
+      <p:sp>
+        <p:nvSpPr>
+          <p:cNvPr id="6" name="右矢印 5"/>
+          <p:cNvSpPr/>
+          <p:nvPr/>
+        </p:nvSpPr>
+        <p:spPr>
+          <a:xfrm>
+            <a:off x="6106119" y="4855635"/>
+            <a:ext cx="792625" cy="727113"/>
+          </a:xfrm>
+          <a:prstGeom prst="rightArrow">
+            <a:avLst/>
+          </a:prstGeom>
+        </p:spPr>
+        <p:style>
+          <a:lnRef idx="2">
+            <a:schemeClr val="accent1">
+              <a:shade val="50000"/>
+            </a:schemeClr>
+          </a:lnRef>
+          <a:fillRef idx="1">
+            <a:schemeClr val="accent1"/>
+          </a:fillRef>
+          <a:effectRef idx="0">
+            <a:schemeClr val="accent1"/>
+          </a:effectRef>
+          <a:fontRef idx="minor">
+            <a:schemeClr val="lt1"/>
+          </a:fontRef>
+        </p:style>
+        <p:txBody>
+          <a:bodyPr rtlCol="0" anchor="ctr"/>
+          <a:lstStyle/>
+          <a:p>
+            <a:pPr algn="ctr"/>
             <a:endParaRPr kumimoji="1" lang="ja-JP" altLang="en-US"/>
           </a:p>
         </p:txBody>
@@ -5193,39 +7128,24 @@
       </p:grpSpPr>
       <p:sp>
         <p:nvSpPr>
-          <p:cNvPr id="2" name="タイトル 1"/>
-          <p:cNvSpPr>
-            <a:spLocks noGrp="1"/>
-          </p:cNvSpPr>
-          <p:nvPr>
-            <p:ph type="ctrTitle"/>
-          </p:nvPr>
-        </p:nvSpPr>
-        <p:spPr/>
-        <p:txBody>
-          <a:bodyPr/>
-          <a:lstStyle/>
-          <a:p>
-            <a:endParaRPr kumimoji="1" lang="ja-JP" altLang="en-US"/>
-          </a:p>
-        </p:txBody>
-      </p:sp>
-      <p:sp>
-        <p:nvSpPr>
-          <p:cNvPr id="3" name="テキスト プレースホルダー 2"/>
-          <p:cNvSpPr>
-            <a:spLocks noGrp="1"/>
-          </p:cNvSpPr>
-          <p:nvPr>
-            <p:ph type="body" sz="quarter" idx="13"/>
-          </p:nvPr>
-        </p:nvSpPr>
-        <p:spPr/>
-        <p:txBody>
-          <a:bodyPr/>
-          <a:lstStyle/>
-          <a:p>
-            <a:endParaRPr kumimoji="1" lang="ja-JP" altLang="en-US"/>
+          <p:cNvPr id="12" name="タイトル 11"/>
+          <p:cNvSpPr>
+            <a:spLocks noGrp="1"/>
+          </p:cNvSpPr>
+          <p:nvPr>
+            <p:ph type="title"/>
+          </p:nvPr>
+        </p:nvSpPr>
+        <p:spPr/>
+        <p:txBody>
+          <a:bodyPr/>
+          <a:lstStyle/>
+          <a:p>
+            <a:r>
+              <a:rPr kumimoji="1" lang="ja-JP" altLang="en-US" dirty="0" smtClean="0"/>
+              <a:t>実験結果（原画像）</a:t>
+            </a:r>
+            <a:endParaRPr kumimoji="1" lang="ja-JP" altLang="en-US" dirty="0"/>
           </a:p>
         </p:txBody>
       </p:sp>
@@ -5244,9 +7164,9 @@
           <a:bodyPr/>
           <a:lstStyle/>
           <a:p>
-            <a:fld id="{3B403CC2-8C20-46B0-9144-E1595A66D793}" type="datetime1">
+            <a:fld id="{B73BE00C-7ADA-4FCD-AAB2-CF527D6B0C23}" type="datetime1">
               <a:rPr kumimoji="1" lang="ja-JP" altLang="en-US" smtClean="0"/>
-              <a:t>2017/7/1</a:t>
+              <a:t>2017/7/5</a:t>
             </a:fld>
             <a:endParaRPr kumimoji="1" lang="ja-JP" altLang="en-US"/>
           </a:p>
@@ -5294,10 +7214,40 @@
           </a:p>
         </p:txBody>
       </p:sp>
+      <p:pic>
+        <p:nvPicPr>
+          <p:cNvPr id="11" name="図 10"/>
+          <p:cNvPicPr>
+            <a:picLocks noChangeAspect="1"/>
+          </p:cNvPicPr>
+          <p:nvPr/>
+        </p:nvPicPr>
+        <p:blipFill>
+          <a:blip r:embed="rId2">
+            <a:extLst>
+              <a:ext uri="{28A0092B-C50C-407E-A947-70E740481C1C}">
+                <a14:useLocalDpi xmlns:a14="http://schemas.microsoft.com/office/drawing/2010/main" val="0"/>
+              </a:ext>
+            </a:extLst>
+          </a:blip>
+          <a:stretch>
+            <a:fillRect/>
+          </a:stretch>
+        </p:blipFill>
+        <p:spPr>
+          <a:xfrm>
+            <a:off x="799368" y="1071646"/>
+            <a:ext cx="7545263" cy="5040000"/>
+          </a:xfrm>
+          <a:prstGeom prst="rect">
+            <a:avLst/>
+          </a:prstGeom>
+        </p:spPr>
+      </p:pic>
     </p:spTree>
     <p:extLst>
       <p:ext uri="{BB962C8B-B14F-4D97-AF65-F5344CB8AC3E}">
-        <p14:creationId xmlns:p14="http://schemas.microsoft.com/office/powerpoint/2010/main" val="807432296"/>
+        <p14:creationId xmlns:p14="http://schemas.microsoft.com/office/powerpoint/2010/main" val="1508678268"/>
       </p:ext>
     </p:extLst>
   </p:cSld>
@@ -5333,7 +7283,7 @@
       </p:grpSpPr>
       <p:sp>
         <p:nvSpPr>
-          <p:cNvPr id="2" name="タイトル 1"/>
+          <p:cNvPr id="12" name="タイトル 11"/>
           <p:cNvSpPr>
             <a:spLocks noGrp="1"/>
           </p:cNvSpPr>
@@ -5346,80 +7296,9 @@
           <a:bodyPr/>
           <a:lstStyle/>
           <a:p>
-            <a:endParaRPr kumimoji="1" lang="ja-JP" altLang="en-US"/>
-          </a:p>
-        </p:txBody>
-      </p:sp>
-      <p:sp>
-        <p:nvSpPr>
-          <p:cNvPr id="3" name="コンテンツ プレースホルダー 2"/>
-          <p:cNvSpPr>
-            <a:spLocks noGrp="1"/>
-          </p:cNvSpPr>
-          <p:nvPr>
-            <p:ph idx="1"/>
-          </p:nvPr>
-        </p:nvSpPr>
-        <p:spPr/>
-        <p:txBody>
-          <a:bodyPr/>
-          <a:lstStyle/>
-          <a:p>
             <a:r>
               <a:rPr kumimoji="1" lang="ja-JP" altLang="en-US" dirty="0" smtClean="0"/>
-              <a:t>箇条書き</a:t>
-            </a:r>
-            <a:r>
-              <a:rPr kumimoji="1" lang="en-US" altLang="ja-JP" dirty="0" smtClean="0"/>
-              <a:t>1</a:t>
-            </a:r>
-          </a:p>
-          <a:p>
-            <a:pPr lvl="1"/>
-            <a:r>
-              <a:rPr lang="ja-JP" altLang="en-US" dirty="0" smtClean="0"/>
-              <a:t>箇条書き</a:t>
-            </a:r>
-            <a:r>
-              <a:rPr lang="en-US" altLang="ja-JP" dirty="0" smtClean="0"/>
-              <a:t>2</a:t>
-            </a:r>
-          </a:p>
-          <a:p>
-            <a:pPr lvl="2"/>
-            <a:r>
-              <a:rPr kumimoji="1" lang="en-US" altLang="ja-JP" dirty="0"/>
-              <a:t> </a:t>
-            </a:r>
-            <a:r>
-              <a:rPr kumimoji="1" lang="ja-JP" altLang="en-US" dirty="0" smtClean="0"/>
-              <a:t>箇条書き</a:t>
-            </a:r>
-            <a:r>
-              <a:rPr kumimoji="1" lang="en-US" altLang="ja-JP" dirty="0" smtClean="0"/>
-              <a:t>3</a:t>
-            </a:r>
-          </a:p>
-          <a:p>
-            <a:pPr lvl="3"/>
-            <a:r>
-              <a:rPr lang="ja-JP" altLang="en-US" dirty="0" smtClean="0"/>
-              <a:t>箇条書き</a:t>
-            </a:r>
-            <a:r>
-              <a:rPr lang="en-US" altLang="ja-JP" dirty="0" smtClean="0"/>
-              <a:t>4</a:t>
-            </a:r>
-          </a:p>
-          <a:p>
-            <a:pPr lvl="4"/>
-            <a:r>
-              <a:rPr kumimoji="1" lang="ja-JP" altLang="en-US" dirty="0" smtClean="0"/>
-              <a:t>箇条書き</a:t>
-            </a:r>
-            <a:r>
-              <a:rPr kumimoji="1" lang="en-US" altLang="ja-JP" dirty="0" smtClean="0"/>
-              <a:t>5</a:t>
+              <a:t>実験結果（塗り絵解答画像）</a:t>
             </a:r>
             <a:endParaRPr kumimoji="1" lang="ja-JP" altLang="en-US" dirty="0"/>
           </a:p>
@@ -5442,7 +7321,7 @@
           <a:p>
             <a:fld id="{B73BE00C-7ADA-4FCD-AAB2-CF527D6B0C23}" type="datetime1">
               <a:rPr kumimoji="1" lang="ja-JP" altLang="en-US" smtClean="0"/>
-              <a:t>2017/7/1</a:t>
+              <a:t>2017/7/5</a:t>
             </a:fld>
             <a:endParaRPr kumimoji="1" lang="ja-JP" altLang="en-US"/>
           </a:p>
@@ -5490,10 +7369,40 @@
           </a:p>
         </p:txBody>
       </p:sp>
+      <p:pic>
+        <p:nvPicPr>
+          <p:cNvPr id="2" name="図 1"/>
+          <p:cNvPicPr>
+            <a:picLocks noChangeAspect="1"/>
+          </p:cNvPicPr>
+          <p:nvPr/>
+        </p:nvPicPr>
+        <p:blipFill>
+          <a:blip r:embed="rId2">
+            <a:extLst>
+              <a:ext uri="{28A0092B-C50C-407E-A947-70E740481C1C}">
+                <a14:useLocalDpi xmlns:a14="http://schemas.microsoft.com/office/drawing/2010/main" val="0"/>
+              </a:ext>
+            </a:extLst>
+          </a:blip>
+          <a:stretch>
+            <a:fillRect/>
+          </a:stretch>
+        </p:blipFill>
+        <p:spPr>
+          <a:xfrm>
+            <a:off x="799368" y="1071646"/>
+            <a:ext cx="7545263" cy="5040000"/>
+          </a:xfrm>
+          <a:prstGeom prst="rect">
+            <a:avLst/>
+          </a:prstGeom>
+        </p:spPr>
+      </p:pic>
     </p:spTree>
     <p:extLst>
       <p:ext uri="{BB962C8B-B14F-4D97-AF65-F5344CB8AC3E}">
-        <p14:creationId xmlns:p14="http://schemas.microsoft.com/office/powerpoint/2010/main" val="3886502372"/>
+        <p14:creationId xmlns:p14="http://schemas.microsoft.com/office/powerpoint/2010/main" val="1255994453"/>
       </p:ext>
     </p:extLst>
   </p:cSld>
@@ -5529,7 +7438,7 @@
       </p:grpSpPr>
       <p:sp>
         <p:nvSpPr>
-          <p:cNvPr id="2" name="タイトル 1"/>
+          <p:cNvPr id="12" name="タイトル 11"/>
           <p:cNvSpPr>
             <a:spLocks noGrp="1"/>
           </p:cNvSpPr>
@@ -5542,26 +7451,11 @@
           <a:bodyPr/>
           <a:lstStyle/>
           <a:p>
-            <a:endParaRPr kumimoji="1" lang="ja-JP" altLang="en-US"/>
-          </a:p>
-        </p:txBody>
-      </p:sp>
-      <p:sp>
-        <p:nvSpPr>
-          <p:cNvPr id="3" name="コンテンツ プレースホルダー 2"/>
-          <p:cNvSpPr>
-            <a:spLocks noGrp="1"/>
-          </p:cNvSpPr>
-          <p:nvPr>
-            <p:ph idx="1"/>
-          </p:nvPr>
-        </p:nvSpPr>
-        <p:spPr/>
-        <p:txBody>
-          <a:bodyPr/>
-          <a:lstStyle/>
-          <a:p>
-            <a:endParaRPr kumimoji="1" lang="ja-JP" altLang="en-US"/>
+            <a:r>
+              <a:rPr kumimoji="1" lang="ja-JP" altLang="en-US" dirty="0" smtClean="0"/>
+              <a:t>実験結果（塗り絵問題画像）</a:t>
+            </a:r>
+            <a:endParaRPr kumimoji="1" lang="ja-JP" altLang="en-US" dirty="0"/>
           </a:p>
         </p:txBody>
       </p:sp>
@@ -5580,9 +7474,9 @@
           <a:bodyPr/>
           <a:lstStyle/>
           <a:p>
-            <a:fld id="{DEEDFEEB-AB76-423B-8BC1-2B3CDB8447F6}" type="datetime1">
+            <a:fld id="{B73BE00C-7ADA-4FCD-AAB2-CF527D6B0C23}" type="datetime1">
               <a:rPr kumimoji="1" lang="ja-JP" altLang="en-US" smtClean="0"/>
-              <a:t>2017/7/1</a:t>
+              <a:t>2017/7/5</a:t>
             </a:fld>
             <a:endParaRPr kumimoji="1" lang="ja-JP" altLang="en-US"/>
           </a:p>
@@ -5630,275 +7524,40 @@
           </a:p>
         </p:txBody>
       </p:sp>
-      <p:sp>
-        <p:nvSpPr>
-          <p:cNvPr id="4" name="四角形吹き出し 3"/>
-          <p:cNvSpPr/>
+      <p:pic>
+        <p:nvPicPr>
+          <p:cNvPr id="2" name="図 1"/>
+          <p:cNvPicPr>
+            <a:picLocks noChangeAspect="1"/>
+          </p:cNvPicPr>
           <p:nvPr/>
-        </p:nvSpPr>
+        </p:nvPicPr>
+        <p:blipFill>
+          <a:blip r:embed="rId2">
+            <a:extLst>
+              <a:ext uri="{28A0092B-C50C-407E-A947-70E740481C1C}">
+                <a14:useLocalDpi xmlns:a14="http://schemas.microsoft.com/office/drawing/2010/main" val="0"/>
+              </a:ext>
+            </a:extLst>
+          </a:blip>
+          <a:stretch>
+            <a:fillRect/>
+          </a:stretch>
+        </p:blipFill>
         <p:spPr>
           <a:xfrm>
-            <a:off x="1432613" y="5314247"/>
-            <a:ext cx="1680796" cy="715109"/>
+            <a:off x="799368" y="1071646"/>
+            <a:ext cx="7545263" cy="5040000"/>
           </a:xfrm>
-          <a:prstGeom prst="wedgeRectCallout">
-            <a:avLst>
-              <a:gd name="adj1" fmla="val -71790"/>
-              <a:gd name="adj2" fmla="val 49761"/>
-            </a:avLst>
-          </a:prstGeom>
-          <a:ln w="19050">
-            <a:solidFill>
-              <a:schemeClr val="accent2">
-                <a:lumMod val="75000"/>
-              </a:schemeClr>
-            </a:solidFill>
-          </a:ln>
-        </p:spPr>
-        <p:style>
-          <a:lnRef idx="2">
-            <a:schemeClr val="accent2"/>
-          </a:lnRef>
-          <a:fillRef idx="1">
-            <a:schemeClr val="lt1"/>
-          </a:fillRef>
-          <a:effectRef idx="0">
-            <a:schemeClr val="accent2"/>
-          </a:effectRef>
-          <a:fontRef idx="minor">
-            <a:schemeClr val="dk1"/>
-          </a:fontRef>
-        </p:style>
-        <p:txBody>
-          <a:bodyPr rtlCol="0" anchor="ctr"/>
-          <a:lstStyle/>
-          <a:p>
-            <a:pPr algn="ctr"/>
-            <a:r>
-              <a:rPr kumimoji="1" lang="ja-JP" altLang="en-US" dirty="0" smtClean="0">
-                <a:latin typeface="+mn-ea"/>
-              </a:rPr>
-              <a:t>吹き出し</a:t>
-            </a:r>
-            <a:endParaRPr kumimoji="1" lang="en-US" altLang="ja-JP" dirty="0" smtClean="0">
-              <a:latin typeface="+mn-ea"/>
-            </a:endParaRPr>
-          </a:p>
-          <a:p>
-            <a:pPr algn="ctr"/>
-            <a:r>
-              <a:rPr kumimoji="1" lang="ja-JP" altLang="en-US" b="1" dirty="0" smtClean="0">
-                <a:solidFill>
-                  <a:srgbClr val="FF0000"/>
-                </a:solidFill>
-                <a:latin typeface="+mn-ea"/>
-              </a:rPr>
-              <a:t>注意</a:t>
-            </a:r>
-            <a:r>
-              <a:rPr kumimoji="1" lang="ja-JP" altLang="en-US" dirty="0">
-                <a:latin typeface="+mn-ea"/>
-              </a:rPr>
-              <a:t>事項</a:t>
-            </a:r>
-          </a:p>
-        </p:txBody>
-      </p:sp>
-      <p:sp>
-        <p:nvSpPr>
-          <p:cNvPr id="10" name="四角形吹き出し 9"/>
-          <p:cNvSpPr/>
-          <p:nvPr/>
-        </p:nvSpPr>
-        <p:spPr>
-          <a:xfrm>
-            <a:off x="3731602" y="5325972"/>
-            <a:ext cx="1680796" cy="715109"/>
-          </a:xfrm>
-          <a:prstGeom prst="wedgeRectCallout">
-            <a:avLst>
-              <a:gd name="adj1" fmla="val -71790"/>
-              <a:gd name="adj2" fmla="val 49761"/>
-            </a:avLst>
+          <a:prstGeom prst="rect">
+            <a:avLst/>
           </a:prstGeom>
         </p:spPr>
-        <p:style>
-          <a:lnRef idx="2">
-            <a:schemeClr val="accent6"/>
-          </a:lnRef>
-          <a:fillRef idx="1">
-            <a:schemeClr val="lt1"/>
-          </a:fillRef>
-          <a:effectRef idx="0">
-            <a:schemeClr val="accent6"/>
-          </a:effectRef>
-          <a:fontRef idx="minor">
-            <a:schemeClr val="dk1"/>
-          </a:fontRef>
-        </p:style>
-        <p:txBody>
-          <a:bodyPr rtlCol="0" anchor="ctr"/>
-          <a:lstStyle/>
-          <a:p>
-            <a:pPr algn="ctr"/>
-            <a:r>
-              <a:rPr kumimoji="1" lang="ja-JP" altLang="en-US" dirty="0" smtClean="0">
-                <a:latin typeface="+mn-ea"/>
-              </a:rPr>
-              <a:t>吹き出し</a:t>
-            </a:r>
-            <a:endParaRPr kumimoji="1" lang="en-US" altLang="ja-JP" dirty="0" smtClean="0">
-              <a:latin typeface="+mn-ea"/>
-            </a:endParaRPr>
-          </a:p>
-          <a:p>
-            <a:pPr algn="ctr"/>
-            <a:r>
-              <a:rPr kumimoji="1" lang="ja-JP" altLang="en-US" dirty="0" smtClean="0">
-                <a:latin typeface="+mn-ea"/>
-              </a:rPr>
-              <a:t>所感など</a:t>
-            </a:r>
-            <a:endParaRPr kumimoji="1" lang="ja-JP" altLang="en-US" dirty="0">
-              <a:latin typeface="+mn-ea"/>
-            </a:endParaRPr>
-          </a:p>
-        </p:txBody>
-      </p:sp>
-      <p:sp>
-        <p:nvSpPr>
-          <p:cNvPr id="11" name="四角形吹き出し 10"/>
-          <p:cNvSpPr/>
-          <p:nvPr/>
-        </p:nvSpPr>
-        <p:spPr>
-          <a:xfrm>
-            <a:off x="6030591" y="5325972"/>
-            <a:ext cx="1680796" cy="715109"/>
-          </a:xfrm>
-          <a:prstGeom prst="wedgeRectCallout">
-            <a:avLst>
-              <a:gd name="adj1" fmla="val -71790"/>
-              <a:gd name="adj2" fmla="val 49761"/>
-            </a:avLst>
-          </a:prstGeom>
-          <a:ln>
-            <a:solidFill>
-              <a:schemeClr val="accent4">
-                <a:lumMod val="75000"/>
-              </a:schemeClr>
-            </a:solidFill>
-          </a:ln>
-        </p:spPr>
-        <p:style>
-          <a:lnRef idx="2">
-            <a:schemeClr val="accent4"/>
-          </a:lnRef>
-          <a:fillRef idx="1">
-            <a:schemeClr val="lt1"/>
-          </a:fillRef>
-          <a:effectRef idx="0">
-            <a:schemeClr val="accent4"/>
-          </a:effectRef>
-          <a:fontRef idx="minor">
-            <a:schemeClr val="dk1"/>
-          </a:fontRef>
-        </p:style>
-        <p:txBody>
-          <a:bodyPr rtlCol="0" anchor="ctr"/>
-          <a:lstStyle/>
-          <a:p>
-            <a:pPr algn="ctr"/>
-            <a:r>
-              <a:rPr kumimoji="1" lang="ja-JP" altLang="en-US" dirty="0" smtClean="0">
-                <a:latin typeface="+mn-ea"/>
-              </a:rPr>
-              <a:t>吹き出し</a:t>
-            </a:r>
-            <a:endParaRPr kumimoji="1" lang="en-US" altLang="ja-JP" dirty="0" smtClean="0">
-              <a:latin typeface="+mn-ea"/>
-            </a:endParaRPr>
-          </a:p>
-          <a:p>
-            <a:pPr algn="ctr"/>
-            <a:r>
-              <a:rPr kumimoji="1" lang="ja-JP" altLang="en-US" dirty="0" smtClean="0">
-                <a:latin typeface="+mn-ea"/>
-              </a:rPr>
-              <a:t>その</a:t>
-            </a:r>
-            <a:r>
-              <a:rPr kumimoji="1" lang="ja-JP" altLang="en-US" dirty="0">
-                <a:latin typeface="+mn-ea"/>
-              </a:rPr>
-              <a:t>他</a:t>
-            </a:r>
-          </a:p>
-        </p:txBody>
-      </p:sp>
-      <p:sp>
-        <p:nvSpPr>
-          <p:cNvPr id="12" name="四角形吹き出し 11"/>
-          <p:cNvSpPr/>
-          <p:nvPr/>
-        </p:nvSpPr>
-        <p:spPr>
-          <a:xfrm>
-            <a:off x="1432612" y="4321212"/>
-            <a:ext cx="3979785" cy="715109"/>
-          </a:xfrm>
-          <a:prstGeom prst="wedgeRectCallout">
-            <a:avLst>
-              <a:gd name="adj1" fmla="val -71790"/>
-              <a:gd name="adj2" fmla="val 49761"/>
-            </a:avLst>
-          </a:prstGeom>
-          <a:solidFill>
-            <a:schemeClr val="accent1">
-              <a:lumMod val="75000"/>
-            </a:schemeClr>
-          </a:solidFill>
-          <a:ln>
-            <a:noFill/>
-          </a:ln>
-        </p:spPr>
-        <p:style>
-          <a:lnRef idx="2">
-            <a:schemeClr val="accent1">
-              <a:shade val="50000"/>
-            </a:schemeClr>
-          </a:lnRef>
-          <a:fillRef idx="1">
-            <a:schemeClr val="accent1"/>
-          </a:fillRef>
-          <a:effectRef idx="0">
-            <a:schemeClr val="accent1"/>
-          </a:effectRef>
-          <a:fontRef idx="minor">
-            <a:schemeClr val="lt1"/>
-          </a:fontRef>
-        </p:style>
-        <p:txBody>
-          <a:bodyPr rtlCol="0" anchor="t"/>
-          <a:lstStyle/>
-          <a:p>
-            <a:pPr algn="just"/>
-            <a:r>
-              <a:rPr kumimoji="1" lang="ja-JP" altLang="en-US" dirty="0" smtClean="0">
-                <a:latin typeface="+mn-ea"/>
-              </a:rPr>
-              <a:t>比較的大きな吹き出し</a:t>
-            </a:r>
-            <a:endParaRPr kumimoji="1" lang="ja-JP" altLang="en-US" dirty="0">
-              <a:latin typeface="+mn-ea"/>
-            </a:endParaRPr>
-          </a:p>
-        </p:txBody>
-      </p:sp>
+      </p:pic>
     </p:spTree>
     <p:extLst>
       <p:ext uri="{BB962C8B-B14F-4D97-AF65-F5344CB8AC3E}">
-        <p14:creationId xmlns:p14="http://schemas.microsoft.com/office/powerpoint/2010/main" val="3602633670"/>
+        <p14:creationId xmlns:p14="http://schemas.microsoft.com/office/powerpoint/2010/main" val="796004906"/>
       </p:ext>
     </p:extLst>
   </p:cSld>
@@ -5916,7 +7575,7 @@
 </file>
 
 <file path=ppt/slides/slide6.xml><?xml version="1.0" encoding="utf-8"?>
-<p:sld xmlns:a="http://schemas.openxmlformats.org/drawingml/2006/main" xmlns:r="http://schemas.openxmlformats.org/officeDocument/2006/relationships" xmlns:p="http://schemas.openxmlformats.org/presentationml/2006/main" show="0">
+<p:sld xmlns:a="http://schemas.openxmlformats.org/drawingml/2006/main" xmlns:r="http://schemas.openxmlformats.org/officeDocument/2006/relationships" xmlns:p="http://schemas.openxmlformats.org/presentationml/2006/main">
   <p:cSld>
     <p:spTree>
       <p:nvGrpSpPr>
@@ -5939,7 +7598,7 @@
             <a:spLocks noGrp="1"/>
           </p:cNvSpPr>
           <p:nvPr>
-            <p:ph type="ctrTitle"/>
+            <p:ph type="title"/>
           </p:nvPr>
         </p:nvSpPr>
         <p:spPr/>
@@ -5949,7 +7608,7 @@
           <a:p>
             <a:r>
               <a:rPr kumimoji="1" lang="ja-JP" altLang="en-US" dirty="0" smtClean="0"/>
-              <a:t>補遺</a:t>
+              <a:t>手法</a:t>
             </a:r>
             <a:endParaRPr kumimoji="1" lang="ja-JP" altLang="en-US" dirty="0"/>
           </a:p>
@@ -5957,7 +7616,158 @@
       </p:sp>
       <p:sp>
         <p:nvSpPr>
-          <p:cNvPr id="3" name="日付プレースホルダー 2"/>
+          <p:cNvPr id="3" name="コンテンツ プレースホルダー 2"/>
+          <p:cNvSpPr>
+            <a:spLocks noGrp="1"/>
+          </p:cNvSpPr>
+          <p:nvPr>
+            <p:ph idx="1"/>
+          </p:nvPr>
+        </p:nvSpPr>
+        <p:spPr/>
+        <p:txBody>
+          <a:bodyPr>
+            <a:normAutofit lnSpcReduction="10000"/>
+          </a:bodyPr>
+          <a:lstStyle/>
+          <a:p>
+            <a:r>
+              <a:rPr lang="ja-JP" altLang="en-US" dirty="0" smtClean="0"/>
+              <a:t>「解答」→「問題」の</a:t>
+            </a:r>
+            <a:r>
+              <a:rPr lang="en-US" altLang="ja-JP" dirty="0" smtClean="0"/>
+              <a:t>2</a:t>
+            </a:r>
+            <a:r>
+              <a:rPr lang="ja-JP" altLang="en-US" dirty="0" smtClean="0"/>
+              <a:t>ステップ</a:t>
+            </a:r>
+            <a:endParaRPr lang="en-US" altLang="ja-JP" dirty="0" smtClean="0"/>
+          </a:p>
+          <a:p>
+            <a:endParaRPr lang="en-US" altLang="ja-JP" dirty="0" smtClean="0"/>
+          </a:p>
+          <a:p>
+            <a:r>
+              <a:rPr lang="ja-JP" altLang="en-US" dirty="0" smtClean="0"/>
+              <a:t>塗り絵</a:t>
+            </a:r>
+            <a:r>
+              <a:rPr lang="ja-JP" altLang="en-US" dirty="0" smtClean="0"/>
+              <a:t>の「解答」画像の生成</a:t>
+            </a:r>
+            <a:endParaRPr lang="en-US" altLang="ja-JP" dirty="0" smtClean="0"/>
+          </a:p>
+          <a:p>
+            <a:pPr marL="785812" lvl="1" indent="-514350">
+              <a:buFont typeface="+mj-lt"/>
+              <a:buAutoNum type="arabicPeriod"/>
+            </a:pPr>
+            <a:r>
+              <a:rPr kumimoji="1" lang="ja-JP" altLang="en-US" dirty="0" smtClean="0"/>
+              <a:t>原画像を </a:t>
+            </a:r>
+            <a:r>
+              <a:rPr lang="en-US" altLang="ja-JP" dirty="0"/>
+              <a:t>m</a:t>
+            </a:r>
+            <a:r>
+              <a:rPr kumimoji="1" lang="en-US" altLang="ja-JP" dirty="0" smtClean="0"/>
+              <a:t>ean shift </a:t>
+            </a:r>
+            <a:r>
+              <a:rPr kumimoji="1" lang="ja-JP" altLang="en-US" dirty="0" smtClean="0"/>
+              <a:t>クラスタリング</a:t>
+            </a:r>
+            <a:endParaRPr kumimoji="1" lang="en-US" altLang="ja-JP" dirty="0" smtClean="0"/>
+          </a:p>
+          <a:p>
+            <a:pPr marL="787400" lvl="2" indent="-342900"/>
+            <a:r>
+              <a:rPr lang="ja-JP" altLang="en-US" dirty="0" smtClean="0"/>
+              <a:t>位置情報，色情報を用いて領域分割</a:t>
+            </a:r>
+            <a:endParaRPr lang="en-US" altLang="ja-JP" dirty="0"/>
+          </a:p>
+          <a:p>
+            <a:pPr marL="785812" lvl="1" indent="-514350">
+              <a:buFont typeface="+mj-lt"/>
+              <a:buAutoNum type="arabicPeriod"/>
+            </a:pPr>
+            <a:r>
+              <a:rPr lang="ja-JP" altLang="en-US" dirty="0" smtClean="0"/>
+              <a:t>得られた画像を，</a:t>
+            </a:r>
+            <a:r>
+              <a:rPr lang="en-US" altLang="ja-JP" dirty="0" smtClean="0"/>
+              <a:t>k-means </a:t>
+            </a:r>
+            <a:r>
+              <a:rPr lang="ja-JP" altLang="en-US" dirty="0" smtClean="0"/>
+              <a:t>クラスタリング</a:t>
+            </a:r>
+            <a:endParaRPr lang="en-US" altLang="ja-JP" dirty="0" smtClean="0"/>
+          </a:p>
+          <a:p>
+            <a:pPr marL="787400" lvl="2" indent="-342900"/>
+            <a:r>
+              <a:rPr lang="ja-JP" altLang="en-US" dirty="0" smtClean="0"/>
+              <a:t>色数を制限して，さらに分類</a:t>
+            </a:r>
+            <a:endParaRPr kumimoji="1" lang="en-US" altLang="ja-JP" dirty="0"/>
+          </a:p>
+          <a:p>
+            <a:endParaRPr lang="en-US" altLang="ja-JP" dirty="0" smtClean="0"/>
+          </a:p>
+          <a:p>
+            <a:r>
+              <a:rPr lang="ja-JP" altLang="en-US" dirty="0" smtClean="0"/>
+              <a:t>塗り絵の「問題」画像の生成</a:t>
+            </a:r>
+            <a:endParaRPr lang="en-US" altLang="ja-JP" dirty="0" smtClean="0"/>
+          </a:p>
+          <a:p>
+            <a:pPr lvl="1"/>
+            <a:r>
+              <a:rPr lang="ja-JP" altLang="en-US" dirty="0" smtClean="0"/>
+              <a:t>各ピクセルについて</a:t>
+            </a:r>
+            <a:r>
+              <a:rPr lang="ja-JP" altLang="en-US" dirty="0"/>
+              <a:t>，</a:t>
+            </a:r>
+            <a:r>
+              <a:rPr lang="ja-JP" altLang="en-US" dirty="0" smtClean="0"/>
+              <a:t>上下左右の色と比較</a:t>
+            </a:r>
+            <a:endParaRPr lang="en-US" altLang="ja-JP" dirty="0" smtClean="0"/>
+          </a:p>
+          <a:p>
+            <a:pPr lvl="2"/>
+            <a:r>
+              <a:rPr lang="ja-JP" altLang="en-US" dirty="0"/>
+              <a:t>周囲</a:t>
+            </a:r>
+            <a:r>
+              <a:rPr lang="ja-JP" altLang="en-US" dirty="0" smtClean="0"/>
+              <a:t>が全部自身と同じなら白，一つでも違えば黒</a:t>
+            </a:r>
+            <a:endParaRPr lang="en-US" altLang="ja-JP" dirty="0" smtClean="0"/>
+          </a:p>
+          <a:p>
+            <a:pPr lvl="2"/>
+            <a:r>
+              <a:rPr lang="ja-JP" altLang="en-US" dirty="0" smtClean="0"/>
+              <a:t>解答画像での閉領域を確実に閉領域にする</a:t>
+            </a:r>
+            <a:endParaRPr lang="en-US" altLang="ja-JP" dirty="0" smtClean="0"/>
+          </a:p>
+        </p:txBody>
+      </p:sp>
+      <p:sp>
+        <p:nvSpPr>
+          <p:cNvPr id="7" name="日付プレースホルダー 6"/>
           <p:cNvSpPr>
             <a:spLocks noGrp="1"/>
           </p:cNvSpPr>
@@ -5970,9 +7780,9 @@
           <a:bodyPr/>
           <a:lstStyle/>
           <a:p>
-            <a:fld id="{BDADFCCA-FEA0-49F1-9EBA-64E79067CB58}" type="datetime1">
+            <a:fld id="{B73BE00C-7ADA-4FCD-AAB2-CF527D6B0C23}" type="datetime1">
               <a:rPr kumimoji="1" lang="ja-JP" altLang="en-US" smtClean="0"/>
-              <a:t>2017/7/1</a:t>
+              <a:t>2017/7/5</a:t>
             </a:fld>
             <a:endParaRPr kumimoji="1" lang="ja-JP" altLang="en-US"/>
           </a:p>
@@ -5980,7 +7790,7 @@
       </p:sp>
       <p:sp>
         <p:nvSpPr>
-          <p:cNvPr id="4" name="フッター プレースホルダー 3"/>
+          <p:cNvPr id="8" name="フッター プレースホルダー 7"/>
           <p:cNvSpPr>
             <a:spLocks noGrp="1"/>
           </p:cNvSpPr>
@@ -5999,7 +7809,7 @@
       </p:sp>
       <p:sp>
         <p:nvSpPr>
-          <p:cNvPr id="5" name="スライド番号プレースホルダー 4"/>
+          <p:cNvPr id="9" name="スライド番号プレースホルダー 8"/>
           <p:cNvSpPr>
             <a:spLocks noGrp="1"/>
           </p:cNvSpPr>
@@ -6020,43 +7830,16 @@
           </a:p>
         </p:txBody>
       </p:sp>
-      <p:sp>
-        <p:nvSpPr>
-          <p:cNvPr id="6" name="テキスト プレースホルダー 5"/>
-          <p:cNvSpPr>
-            <a:spLocks noGrp="1"/>
-          </p:cNvSpPr>
-          <p:nvPr>
-            <p:ph type="body" sz="quarter" idx="13"/>
-          </p:nvPr>
-        </p:nvSpPr>
-        <p:spPr/>
-        <p:txBody>
-          <a:bodyPr/>
-          <a:lstStyle/>
-          <a:p>
-            <a:endParaRPr kumimoji="1" lang="ja-JP" altLang="en-US"/>
-          </a:p>
-        </p:txBody>
-      </p:sp>
     </p:spTree>
     <p:extLst>
       <p:ext uri="{BB962C8B-B14F-4D97-AF65-F5344CB8AC3E}">
-        <p14:creationId xmlns:p14="http://schemas.microsoft.com/office/powerpoint/2010/main" val="1020548274"/>
+        <p14:creationId xmlns:p14="http://schemas.microsoft.com/office/powerpoint/2010/main" val="3886502372"/>
       </p:ext>
     </p:extLst>
   </p:cSld>
   <p:clrMapOvr>
     <a:masterClrMapping/>
   </p:clrMapOvr>
-  <mc:AlternateContent xmlns:mc="http://schemas.openxmlformats.org/markup-compatibility/2006" xmlns:p14="http://schemas.microsoft.com/office/powerpoint/2010/main">
-    <mc:Choice Requires="p14">
-      <p:transition spd="slow" p14:dur="2000"/>
-    </mc:Choice>
-    <mc:Fallback xmlns="">
-      <p:transition spd="slow"/>
-    </mc:Fallback>
-  </mc:AlternateContent>
   <p:timing>
     <p:tnLst>
       <p:par>
@@ -6068,7 +7851,7 @@
 </file>
 
 <file path=ppt/slides/slide7.xml><?xml version="1.0" encoding="utf-8"?>
-<p:sld xmlns:a="http://schemas.openxmlformats.org/drawingml/2006/main" xmlns:r="http://schemas.openxmlformats.org/officeDocument/2006/relationships" xmlns:p="http://schemas.openxmlformats.org/presentationml/2006/main" show="0">
+<p:sld xmlns:a="http://schemas.openxmlformats.org/drawingml/2006/main" xmlns:r="http://schemas.openxmlformats.org/officeDocument/2006/relationships" xmlns:p="http://schemas.openxmlformats.org/presentationml/2006/main">
   <p:cSld>
     <p:spTree>
       <p:nvGrpSpPr>
@@ -6099,6 +7882,14 @@
           <a:bodyPr/>
           <a:lstStyle/>
           <a:p>
+            <a:r>
+              <a:rPr lang="ja-JP" altLang="en-US" dirty="0" smtClean="0"/>
+              <a:t>実験</a:t>
+            </a:r>
+            <a:r>
+              <a:rPr lang="ja-JP" altLang="en-US" dirty="0"/>
+              <a:t>条件</a:t>
+            </a:r>
             <a:endParaRPr kumimoji="1" lang="ja-JP" altLang="en-US" dirty="0"/>
           </a:p>
         </p:txBody>
@@ -6118,13 +7909,150 @@
           <a:bodyPr/>
           <a:lstStyle/>
           <a:p>
-            <a:endParaRPr kumimoji="1" lang="ja-JP" altLang="en-US"/>
-          </a:p>
-        </p:txBody>
-      </p:sp>
-      <p:sp>
-        <p:nvSpPr>
-          <p:cNvPr id="4" name="日付プレースホルダー 3"/>
+            <a:r>
+              <a:rPr lang="ja-JP" altLang="en-US" dirty="0" smtClean="0"/>
+              <a:t>画像</a:t>
+            </a:r>
+            <a:r>
+              <a:rPr lang="ja-JP" altLang="en-US" dirty="0"/>
+              <a:t>変換</a:t>
+            </a:r>
+            <a:r>
+              <a:rPr lang="ja-JP" altLang="en-US" dirty="0" smtClean="0"/>
+              <a:t>の実験</a:t>
+            </a:r>
+            <a:endParaRPr lang="en-US" altLang="ja-JP" dirty="0" smtClean="0"/>
+          </a:p>
+          <a:p>
+            <a:pPr lvl="1"/>
+            <a:r>
+              <a:rPr lang="ja-JP" altLang="en-US" dirty="0" smtClean="0"/>
+              <a:t>画像：かもめの画像（</a:t>
+            </a:r>
+            <a:r>
+              <a:rPr lang="en-US" altLang="ja-JP" dirty="0" smtClean="0"/>
+              <a:t>Public Domain</a:t>
+            </a:r>
+            <a:r>
+              <a:rPr lang="ja-JP" altLang="en-US" dirty="0" smtClean="0"/>
+              <a:t>）</a:t>
+            </a:r>
+            <a:endParaRPr lang="en-US" altLang="ja-JP" dirty="0" smtClean="0"/>
+          </a:p>
+          <a:p>
+            <a:pPr lvl="1"/>
+            <a:r>
+              <a:rPr kumimoji="1" lang="ja-JP" altLang="en-US" dirty="0" smtClean="0"/>
+              <a:t>画素：</a:t>
+            </a:r>
+            <a:r>
+              <a:rPr lang="en-US" altLang="ja-JP" dirty="0" smtClean="0"/>
+              <a:t>1024×684</a:t>
+            </a:r>
+          </a:p>
+          <a:p>
+            <a:pPr lvl="1"/>
+            <a:endParaRPr lang="en-US" altLang="ja-JP" dirty="0" smtClean="0"/>
+          </a:p>
+          <a:p>
+            <a:pPr lvl="1"/>
+            <a:r>
+              <a:rPr lang="en-US" altLang="ja-JP" dirty="0" smtClean="0"/>
+              <a:t>Mean shift </a:t>
+            </a:r>
+            <a:r>
+              <a:rPr lang="ja-JP" altLang="en-US" dirty="0" smtClean="0"/>
+              <a:t>法でのパラメータ</a:t>
+            </a:r>
+            <a:endParaRPr lang="en-US" altLang="ja-JP" dirty="0" smtClean="0"/>
+          </a:p>
+          <a:p>
+            <a:pPr lvl="2"/>
+            <a:r>
+              <a:rPr lang="ja-JP" altLang="en-US" dirty="0"/>
+              <a:t>位置</a:t>
+            </a:r>
+            <a:r>
+              <a:rPr lang="ja-JP" altLang="en-US" dirty="0" smtClean="0"/>
+              <a:t>空間窓半径：</a:t>
+            </a:r>
+            <a:r>
+              <a:rPr lang="en-US" altLang="ja-JP" dirty="0" smtClean="0"/>
+              <a:t>32px</a:t>
+            </a:r>
+          </a:p>
+          <a:p>
+            <a:pPr lvl="2"/>
+            <a:r>
+              <a:rPr lang="ja-JP" altLang="en-US" dirty="0" smtClean="0"/>
+              <a:t>　色空間窓半径：</a:t>
+            </a:r>
+            <a:r>
+              <a:rPr lang="en-US" altLang="ja-JP" dirty="0" smtClean="0"/>
+              <a:t>16px</a:t>
+            </a:r>
+          </a:p>
+          <a:p>
+            <a:pPr lvl="2"/>
+            <a:endParaRPr lang="en-US" altLang="ja-JP" dirty="0" smtClean="0"/>
+          </a:p>
+          <a:p>
+            <a:pPr lvl="1"/>
+            <a:r>
+              <a:rPr lang="en-US" altLang="ja-JP" dirty="0" smtClean="0"/>
+              <a:t>k-means </a:t>
+            </a:r>
+            <a:r>
+              <a:rPr lang="ja-JP" altLang="en-US" dirty="0" smtClean="0"/>
+              <a:t>法でのパラメータ</a:t>
+            </a:r>
+            <a:endParaRPr lang="en-US" altLang="ja-JP" dirty="0" smtClean="0"/>
+          </a:p>
+          <a:p>
+            <a:pPr lvl="2"/>
+            <a:r>
+              <a:rPr lang="ja-JP" altLang="en-US" dirty="0" smtClean="0"/>
+              <a:t>　　クラスタ数：</a:t>
+            </a:r>
+            <a:r>
+              <a:rPr lang="en-US" altLang="ja-JP" dirty="0"/>
+              <a:t>8</a:t>
+            </a:r>
+            <a:endParaRPr lang="en-US" altLang="ja-JP" dirty="0" smtClean="0"/>
+          </a:p>
+          <a:p>
+            <a:pPr lvl="2"/>
+            <a:r>
+              <a:rPr lang="ja-JP" altLang="en-US" dirty="0"/>
+              <a:t>　</a:t>
+            </a:r>
+            <a:r>
+              <a:rPr lang="ja-JP" altLang="en-US" dirty="0" smtClean="0"/>
+              <a:t>　　試行回数：</a:t>
+            </a:r>
+            <a:r>
+              <a:rPr lang="en-US" altLang="ja-JP" dirty="0" smtClean="0"/>
+              <a:t>10</a:t>
+            </a:r>
+            <a:r>
+              <a:rPr lang="ja-JP" altLang="en-US" dirty="0" smtClean="0"/>
+              <a:t>回</a:t>
+            </a:r>
+            <a:endParaRPr lang="en-US" altLang="ja-JP" dirty="0" smtClean="0"/>
+          </a:p>
+          <a:p>
+            <a:pPr lvl="2"/>
+            <a:endParaRPr lang="en-US" altLang="ja-JP" dirty="0" smtClean="0"/>
+          </a:p>
+          <a:p>
+            <a:pPr lvl="1"/>
+            <a:endParaRPr kumimoji="1" lang="en-US" altLang="ja-JP" dirty="0" smtClean="0"/>
+          </a:p>
+        </p:txBody>
+      </p:sp>
+      <p:sp>
+        <p:nvSpPr>
+          <p:cNvPr id="7" name="日付プレースホルダー 6"/>
           <p:cNvSpPr>
             <a:spLocks noGrp="1"/>
           </p:cNvSpPr>
@@ -6137,9 +8065,9 @@
           <a:bodyPr/>
           <a:lstStyle/>
           <a:p>
-            <a:fld id="{67DC942D-6C63-4B5F-9446-D7E9D4D87299}" type="datetime1">
+            <a:fld id="{B73BE00C-7ADA-4FCD-AAB2-CF527D6B0C23}" type="datetime1">
               <a:rPr kumimoji="1" lang="ja-JP" altLang="en-US" smtClean="0"/>
-              <a:t>2017/7/1</a:t>
+              <a:t>2017/7/5</a:t>
             </a:fld>
             <a:endParaRPr kumimoji="1" lang="ja-JP" altLang="en-US"/>
           </a:p>
@@ -6147,7 +8075,7 @@
       </p:sp>
       <p:sp>
         <p:nvSpPr>
-          <p:cNvPr id="5" name="フッター プレースホルダー 4"/>
+          <p:cNvPr id="8" name="フッター プレースホルダー 7"/>
           <p:cNvSpPr>
             <a:spLocks noGrp="1"/>
           </p:cNvSpPr>
@@ -6166,7 +8094,7 @@
       </p:sp>
       <p:sp>
         <p:nvSpPr>
-          <p:cNvPr id="6" name="スライド番号プレースホルダー 5"/>
+          <p:cNvPr id="9" name="スライド番号プレースホルダー 8"/>
           <p:cNvSpPr>
             <a:spLocks noGrp="1"/>
           </p:cNvSpPr>
@@ -6190,21 +8118,333 @@
     </p:spTree>
     <p:extLst>
       <p:ext uri="{BB962C8B-B14F-4D97-AF65-F5344CB8AC3E}">
-        <p14:creationId xmlns:p14="http://schemas.microsoft.com/office/powerpoint/2010/main" val="4226712121"/>
+        <p14:creationId xmlns:p14="http://schemas.microsoft.com/office/powerpoint/2010/main" val="2918599866"/>
       </p:ext>
     </p:extLst>
   </p:cSld>
   <p:clrMapOvr>
     <a:masterClrMapping/>
   </p:clrMapOvr>
-  <mc:AlternateContent xmlns:mc="http://schemas.openxmlformats.org/markup-compatibility/2006" xmlns:p14="http://schemas.microsoft.com/office/powerpoint/2010/main">
-    <mc:Choice Requires="p14">
-      <p:transition spd="slow" p14:dur="2000"/>
-    </mc:Choice>
-    <mc:Fallback xmlns="">
-      <p:transition spd="slow"/>
-    </mc:Fallback>
-  </mc:AlternateContent>
+  <p:timing>
+    <p:tnLst>
+      <p:par>
+        <p:cTn id="1" dur="indefinite" restart="never" nodeType="tmRoot"/>
+      </p:par>
+    </p:tnLst>
+  </p:timing>
+</p:sld>
+</file>
+
+<file path=ppt/slides/slide8.xml><?xml version="1.0" encoding="utf-8"?>
+<p:sld xmlns:a="http://schemas.openxmlformats.org/drawingml/2006/main" xmlns:r="http://schemas.openxmlformats.org/officeDocument/2006/relationships" xmlns:p="http://schemas.openxmlformats.org/presentationml/2006/main">
+  <p:cSld>
+    <p:spTree>
+      <p:nvGrpSpPr>
+        <p:cNvPr id="1" name=""/>
+        <p:cNvGrpSpPr/>
+        <p:nvPr/>
+      </p:nvGrpSpPr>
+      <p:grpSpPr>
+        <a:xfrm>
+          <a:off x="0" y="0"/>
+          <a:ext cx="0" cy="0"/>
+          <a:chOff x="0" y="0"/>
+          <a:chExt cx="0" cy="0"/>
+        </a:xfrm>
+      </p:grpSpPr>
+      <p:sp>
+        <p:nvSpPr>
+          <p:cNvPr id="12" name="タイトル 11"/>
+          <p:cNvSpPr>
+            <a:spLocks noGrp="1"/>
+          </p:cNvSpPr>
+          <p:nvPr>
+            <p:ph type="title"/>
+          </p:nvPr>
+        </p:nvSpPr>
+        <p:spPr/>
+        <p:txBody>
+          <a:bodyPr/>
+          <a:lstStyle/>
+          <a:p>
+            <a:r>
+              <a:rPr kumimoji="1" lang="ja-JP" altLang="en-US" dirty="0" smtClean="0"/>
+              <a:t>実験結果（</a:t>
+            </a:r>
+            <a:r>
+              <a:rPr kumimoji="1" lang="ja-JP" altLang="en-US" dirty="0" smtClean="0"/>
+              <a:t>原画像，再掲）</a:t>
+            </a:r>
+            <a:endParaRPr kumimoji="1" lang="ja-JP" altLang="en-US" dirty="0"/>
+          </a:p>
+        </p:txBody>
+      </p:sp>
+      <p:sp>
+        <p:nvSpPr>
+          <p:cNvPr id="7" name="日付プレースホルダー 6"/>
+          <p:cNvSpPr>
+            <a:spLocks noGrp="1"/>
+          </p:cNvSpPr>
+          <p:nvPr>
+            <p:ph type="dt" sz="half" idx="10"/>
+          </p:nvPr>
+        </p:nvSpPr>
+        <p:spPr/>
+        <p:txBody>
+          <a:bodyPr/>
+          <a:lstStyle/>
+          <a:p>
+            <a:fld id="{B73BE00C-7ADA-4FCD-AAB2-CF527D6B0C23}" type="datetime1">
+              <a:rPr kumimoji="1" lang="ja-JP" altLang="en-US" smtClean="0"/>
+              <a:t>2017/7/5</a:t>
+            </a:fld>
+            <a:endParaRPr kumimoji="1" lang="ja-JP" altLang="en-US"/>
+          </a:p>
+        </p:txBody>
+      </p:sp>
+      <p:sp>
+        <p:nvSpPr>
+          <p:cNvPr id="8" name="フッター プレースホルダー 7"/>
+          <p:cNvSpPr>
+            <a:spLocks noGrp="1"/>
+          </p:cNvSpPr>
+          <p:nvPr>
+            <p:ph type="ftr" sz="quarter" idx="11"/>
+          </p:nvPr>
+        </p:nvSpPr>
+        <p:spPr/>
+        <p:txBody>
+          <a:bodyPr/>
+          <a:lstStyle/>
+          <a:p>
+            <a:endParaRPr kumimoji="1" lang="ja-JP" altLang="en-US"/>
+          </a:p>
+        </p:txBody>
+      </p:sp>
+      <p:sp>
+        <p:nvSpPr>
+          <p:cNvPr id="9" name="スライド番号プレースホルダー 8"/>
+          <p:cNvSpPr>
+            <a:spLocks noGrp="1"/>
+          </p:cNvSpPr>
+          <p:nvPr>
+            <p:ph type="sldNum" sz="quarter" idx="12"/>
+          </p:nvPr>
+        </p:nvSpPr>
+        <p:spPr/>
+        <p:txBody>
+          <a:bodyPr/>
+          <a:lstStyle/>
+          <a:p>
+            <a:fld id="{1833CB71-1218-46DA-97FE-FEE1D40BAC88}" type="slidenum">
+              <a:rPr kumimoji="1" lang="ja-JP" altLang="en-US" smtClean="0"/>
+              <a:t>8</a:t>
+            </a:fld>
+            <a:endParaRPr kumimoji="1" lang="ja-JP" altLang="en-US"/>
+          </a:p>
+        </p:txBody>
+      </p:sp>
+      <p:pic>
+        <p:nvPicPr>
+          <p:cNvPr id="11" name="図 10"/>
+          <p:cNvPicPr>
+            <a:picLocks noChangeAspect="1"/>
+          </p:cNvPicPr>
+          <p:nvPr/>
+        </p:nvPicPr>
+        <p:blipFill>
+          <a:blip r:embed="rId2">
+            <a:extLst>
+              <a:ext uri="{28A0092B-C50C-407E-A947-70E740481C1C}">
+                <a14:useLocalDpi xmlns:a14="http://schemas.microsoft.com/office/drawing/2010/main" val="0"/>
+              </a:ext>
+            </a:extLst>
+          </a:blip>
+          <a:stretch>
+            <a:fillRect/>
+          </a:stretch>
+        </p:blipFill>
+        <p:spPr>
+          <a:xfrm>
+            <a:off x="799368" y="1071646"/>
+            <a:ext cx="7545263" cy="5040000"/>
+          </a:xfrm>
+          <a:prstGeom prst="rect">
+            <a:avLst/>
+          </a:prstGeom>
+        </p:spPr>
+      </p:pic>
+    </p:spTree>
+    <p:extLst>
+      <p:ext uri="{BB962C8B-B14F-4D97-AF65-F5344CB8AC3E}">
+        <p14:creationId xmlns:p14="http://schemas.microsoft.com/office/powerpoint/2010/main" val="1533154021"/>
+      </p:ext>
+    </p:extLst>
+  </p:cSld>
+  <p:clrMapOvr>
+    <a:masterClrMapping/>
+  </p:clrMapOvr>
+  <p:timing>
+    <p:tnLst>
+      <p:par>
+        <p:cTn id="1" dur="indefinite" restart="never" nodeType="tmRoot"/>
+      </p:par>
+    </p:tnLst>
+  </p:timing>
+</p:sld>
+</file>
+
+<file path=ppt/slides/slide9.xml><?xml version="1.0" encoding="utf-8"?>
+<p:sld xmlns:a="http://schemas.openxmlformats.org/drawingml/2006/main" xmlns:r="http://schemas.openxmlformats.org/officeDocument/2006/relationships" xmlns:p="http://schemas.openxmlformats.org/presentationml/2006/main">
+  <p:cSld>
+    <p:spTree>
+      <p:nvGrpSpPr>
+        <p:cNvPr id="1" name=""/>
+        <p:cNvGrpSpPr/>
+        <p:nvPr/>
+      </p:nvGrpSpPr>
+      <p:grpSpPr>
+        <a:xfrm>
+          <a:off x="0" y="0"/>
+          <a:ext cx="0" cy="0"/>
+          <a:chOff x="0" y="0"/>
+          <a:chExt cx="0" cy="0"/>
+        </a:xfrm>
+      </p:grpSpPr>
+      <p:sp>
+        <p:nvSpPr>
+          <p:cNvPr id="12" name="タイトル 11"/>
+          <p:cNvSpPr>
+            <a:spLocks noGrp="1"/>
+          </p:cNvSpPr>
+          <p:nvPr>
+            <p:ph type="title"/>
+          </p:nvPr>
+        </p:nvSpPr>
+        <p:spPr/>
+        <p:txBody>
+          <a:bodyPr>
+            <a:normAutofit/>
+          </a:bodyPr>
+          <a:lstStyle/>
+          <a:p>
+            <a:r>
+              <a:rPr kumimoji="1" lang="ja-JP" altLang="en-US" dirty="0" smtClean="0"/>
+              <a:t>実験結果（塗り絵解答</a:t>
+            </a:r>
+            <a:r>
+              <a:rPr kumimoji="1" lang="ja-JP" altLang="en-US" dirty="0" smtClean="0"/>
+              <a:t>画像，再掲）</a:t>
+            </a:r>
+            <a:endParaRPr kumimoji="1" lang="ja-JP" altLang="en-US" dirty="0"/>
+          </a:p>
+        </p:txBody>
+      </p:sp>
+      <p:sp>
+        <p:nvSpPr>
+          <p:cNvPr id="7" name="日付プレースホルダー 6"/>
+          <p:cNvSpPr>
+            <a:spLocks noGrp="1"/>
+          </p:cNvSpPr>
+          <p:nvPr>
+            <p:ph type="dt" sz="half" idx="10"/>
+          </p:nvPr>
+        </p:nvSpPr>
+        <p:spPr/>
+        <p:txBody>
+          <a:bodyPr/>
+          <a:lstStyle/>
+          <a:p>
+            <a:fld id="{B73BE00C-7ADA-4FCD-AAB2-CF527D6B0C23}" type="datetime1">
+              <a:rPr kumimoji="1" lang="ja-JP" altLang="en-US" smtClean="0"/>
+              <a:t>2017/7/5</a:t>
+            </a:fld>
+            <a:endParaRPr kumimoji="1" lang="ja-JP" altLang="en-US"/>
+          </a:p>
+        </p:txBody>
+      </p:sp>
+      <p:sp>
+        <p:nvSpPr>
+          <p:cNvPr id="8" name="フッター プレースホルダー 7"/>
+          <p:cNvSpPr>
+            <a:spLocks noGrp="1"/>
+          </p:cNvSpPr>
+          <p:nvPr>
+            <p:ph type="ftr" sz="quarter" idx="11"/>
+          </p:nvPr>
+        </p:nvSpPr>
+        <p:spPr/>
+        <p:txBody>
+          <a:bodyPr/>
+          <a:lstStyle/>
+          <a:p>
+            <a:endParaRPr kumimoji="1" lang="ja-JP" altLang="en-US"/>
+          </a:p>
+        </p:txBody>
+      </p:sp>
+      <p:sp>
+        <p:nvSpPr>
+          <p:cNvPr id="9" name="スライド番号プレースホルダー 8"/>
+          <p:cNvSpPr>
+            <a:spLocks noGrp="1"/>
+          </p:cNvSpPr>
+          <p:nvPr>
+            <p:ph type="sldNum" sz="quarter" idx="12"/>
+          </p:nvPr>
+        </p:nvSpPr>
+        <p:spPr/>
+        <p:txBody>
+          <a:bodyPr/>
+          <a:lstStyle/>
+          <a:p>
+            <a:fld id="{1833CB71-1218-46DA-97FE-FEE1D40BAC88}" type="slidenum">
+              <a:rPr kumimoji="1" lang="ja-JP" altLang="en-US" smtClean="0"/>
+              <a:t>9</a:t>
+            </a:fld>
+            <a:endParaRPr kumimoji="1" lang="ja-JP" altLang="en-US"/>
+          </a:p>
+        </p:txBody>
+      </p:sp>
+      <p:pic>
+        <p:nvPicPr>
+          <p:cNvPr id="2" name="図 1"/>
+          <p:cNvPicPr>
+            <a:picLocks noChangeAspect="1"/>
+          </p:cNvPicPr>
+          <p:nvPr/>
+        </p:nvPicPr>
+        <p:blipFill>
+          <a:blip r:embed="rId2">
+            <a:extLst>
+              <a:ext uri="{28A0092B-C50C-407E-A947-70E740481C1C}">
+                <a14:useLocalDpi xmlns:a14="http://schemas.microsoft.com/office/drawing/2010/main" val="0"/>
+              </a:ext>
+            </a:extLst>
+          </a:blip>
+          <a:stretch>
+            <a:fillRect/>
+          </a:stretch>
+        </p:blipFill>
+        <p:spPr>
+          <a:xfrm>
+            <a:off x="799368" y="1071646"/>
+            <a:ext cx="7545263" cy="5040000"/>
+          </a:xfrm>
+          <a:prstGeom prst="rect">
+            <a:avLst/>
+          </a:prstGeom>
+        </p:spPr>
+      </p:pic>
+    </p:spTree>
+    <p:extLst>
+      <p:ext uri="{BB962C8B-B14F-4D97-AF65-F5344CB8AC3E}">
+        <p14:creationId xmlns:p14="http://schemas.microsoft.com/office/powerpoint/2010/main" val="2632106818"/>
+      </p:ext>
+    </p:extLst>
+  </p:cSld>
+  <p:clrMapOvr>
+    <a:masterClrMapping/>
+  </p:clrMapOvr>
   <p:timing>
     <p:tnLst>
       <p:par>

</xml_diff>